<commit_message>
V1 CLI and text files spec
</commit_message>
<xml_diff>
--- a/docs/phototag.pptx
+++ b/docs/phototag.pptx
@@ -5,12 +5,16 @@
     <p:sldMasterId id="2147483648" r:id="rId1"/>
   </p:sldMasterIdLst>
   <p:sldIdLst>
-    <p:sldId id="257" r:id="rId2"/>
-    <p:sldId id="258" r:id="rId3"/>
-    <p:sldId id="259" r:id="rId4"/>
-    <p:sldId id="260" r:id="rId5"/>
-    <p:sldId id="261" r:id="rId6"/>
-    <p:sldId id="262" r:id="rId7"/>
+    <p:sldId id="264" r:id="rId2"/>
+    <p:sldId id="265" r:id="rId3"/>
+    <p:sldId id="267" r:id="rId4"/>
+    <p:sldId id="266" r:id="rId5"/>
+    <p:sldId id="258" r:id="rId6"/>
+    <p:sldId id="263" r:id="rId7"/>
+    <p:sldId id="259" r:id="rId8"/>
+    <p:sldId id="260" r:id="rId9"/>
+    <p:sldId id="261" r:id="rId10"/>
+    <p:sldId id="262" r:id="rId11"/>
   </p:sldIdLst>
   <p:sldSz cx="12192000" cy="6858000"/>
   <p:notesSz cx="6858000" cy="9144000"/>
@@ -109,6 +113,37 @@
       </a:defRPr>
     </a:lvl9pPr>
   </p:defaultTextStyle>
+  <p:extLst>
+    <p:ext uri="{521415D9-36F7-43E2-AB2F-B90AF26B5E84}">
+      <p14:sectionLst xmlns:p14="http://schemas.microsoft.com/office/powerpoint/2010/main">
+        <p14:section name="intro" id="{9EAB8161-CBD2-42FC-9BEA-89D9A57208F3}">
+          <p14:sldIdLst>
+            <p14:sldId id="264"/>
+          </p14:sldIdLst>
+        </p14:section>
+        <p14:section name="data structure" id="{0D5F90DF-C70D-42B9-BF57-68158AB7AD25}">
+          <p14:sldIdLst>
+            <p14:sldId id="265"/>
+            <p14:sldId id="267"/>
+          </p14:sldIdLst>
+        </p14:section>
+        <p14:section name="command-line tool" id="{59666B20-F88E-41D1-BBE7-0116B248D032}">
+          <p14:sldIdLst>
+            <p14:sldId id="266"/>
+            <p14:sldId id="258"/>
+            <p14:sldId id="263"/>
+            <p14:sldId id="259"/>
+            <p14:sldId id="260"/>
+            <p14:sldId id="261"/>
+            <p14:sldId id="262"/>
+          </p14:sldIdLst>
+        </p14:section>
+      </p14:sectionLst>
+    </p:ext>
+    <p:ext uri="{EFAFB233-063F-42B5-8137-9DF3F51BA10A}">
+      <p15:sldGuideLst xmlns:p15="http://schemas.microsoft.com/office/powerpoint/2012/main"/>
+    </p:ext>
+  </p:extLst>
 </p:presentation>
 </file>
 
@@ -157,7 +192,6 @@
               <a:rPr lang="en-US"/>
               <a:t>Click to edit Master title style</a:t>
             </a:r>
-            <a:endParaRPr lang="en-US"/>
           </a:p>
         </p:txBody>
       </p:sp>
@@ -222,7 +256,6 @@
               <a:rPr lang="en-US"/>
               <a:t>Click to edit Master subtitle style</a:t>
             </a:r>
-            <a:endParaRPr lang="en-US"/>
           </a:p>
         </p:txBody>
       </p:sp>
@@ -243,7 +276,7 @@
           <a:p>
             <a:fld id="{4D11C841-3C48-4AA2-BE2C-6313081B2D1E}" type="datetimeFigureOut">
               <a:rPr lang="en-US" smtClean="0"/>
-              <a:t>9/24/2016</a:t>
+              <a:t>9/25/2016</a:t>
             </a:fld>
             <a:endParaRPr lang="en-US"/>
           </a:p>
@@ -340,7 +373,6 @@
               <a:rPr lang="en-US"/>
               <a:t>Click to edit Master title style</a:t>
             </a:r>
-            <a:endParaRPr lang="en-US"/>
           </a:p>
         </p:txBody>
       </p:sp>
@@ -392,7 +424,6 @@
               <a:rPr lang="en-US"/>
               <a:t>Fifth level</a:t>
             </a:r>
-            <a:endParaRPr lang="en-US"/>
           </a:p>
         </p:txBody>
       </p:sp>
@@ -413,7 +444,7 @@
           <a:p>
             <a:fld id="{4D11C841-3C48-4AA2-BE2C-6313081B2D1E}" type="datetimeFigureOut">
               <a:rPr lang="en-US" smtClean="0"/>
-              <a:t>9/24/2016</a:t>
+              <a:t>9/25/2016</a:t>
             </a:fld>
             <a:endParaRPr lang="en-US"/>
           </a:p>
@@ -515,7 +546,6 @@
               <a:rPr lang="en-US"/>
               <a:t>Click to edit Master title style</a:t>
             </a:r>
-            <a:endParaRPr lang="en-US"/>
           </a:p>
         </p:txBody>
       </p:sp>
@@ -572,7 +602,6 @@
               <a:rPr lang="en-US"/>
               <a:t>Fifth level</a:t>
             </a:r>
-            <a:endParaRPr lang="en-US"/>
           </a:p>
         </p:txBody>
       </p:sp>
@@ -593,7 +622,7 @@
           <a:p>
             <a:fld id="{4D11C841-3C48-4AA2-BE2C-6313081B2D1E}" type="datetimeFigureOut">
               <a:rPr lang="en-US" smtClean="0"/>
-              <a:t>9/24/2016</a:t>
+              <a:t>9/25/2016</a:t>
             </a:fld>
             <a:endParaRPr lang="en-US"/>
           </a:p>
@@ -690,7 +719,6 @@
               <a:rPr lang="en-US"/>
               <a:t>Click to edit Master title style</a:t>
             </a:r>
-            <a:endParaRPr lang="en-US"/>
           </a:p>
         </p:txBody>
       </p:sp>
@@ -742,7 +770,6 @@
               <a:rPr lang="en-US"/>
               <a:t>Fifth level</a:t>
             </a:r>
-            <a:endParaRPr lang="en-US"/>
           </a:p>
         </p:txBody>
       </p:sp>
@@ -763,7 +790,7 @@
           <a:p>
             <a:fld id="{4D11C841-3C48-4AA2-BE2C-6313081B2D1E}" type="datetimeFigureOut">
               <a:rPr lang="en-US" smtClean="0"/>
-              <a:t>9/24/2016</a:t>
+              <a:t>9/25/2016</a:t>
             </a:fld>
             <a:endParaRPr lang="en-US"/>
           </a:p>
@@ -869,7 +896,6 @@
               <a:rPr lang="en-US"/>
               <a:t>Click to edit Master title style</a:t>
             </a:r>
-            <a:endParaRPr lang="en-US"/>
           </a:p>
         </p:txBody>
       </p:sp>
@@ -1009,7 +1035,7 @@
           <a:p>
             <a:fld id="{4D11C841-3C48-4AA2-BE2C-6313081B2D1E}" type="datetimeFigureOut">
               <a:rPr lang="en-US" smtClean="0"/>
-              <a:t>9/24/2016</a:t>
+              <a:t>9/25/2016</a:t>
             </a:fld>
             <a:endParaRPr lang="en-US"/>
           </a:p>
@@ -1106,7 +1132,6 @@
               <a:rPr lang="en-US"/>
               <a:t>Click to edit Master title style</a:t>
             </a:r>
-            <a:endParaRPr lang="en-US"/>
           </a:p>
         </p:txBody>
       </p:sp>
@@ -1163,7 +1188,6 @@
               <a:rPr lang="en-US"/>
               <a:t>Fifth level</a:t>
             </a:r>
-            <a:endParaRPr lang="en-US"/>
           </a:p>
         </p:txBody>
       </p:sp>
@@ -1220,7 +1244,6 @@
               <a:rPr lang="en-US"/>
               <a:t>Fifth level</a:t>
             </a:r>
-            <a:endParaRPr lang="en-US"/>
           </a:p>
         </p:txBody>
       </p:sp>
@@ -1241,7 +1264,7 @@
           <a:p>
             <a:fld id="{4D11C841-3C48-4AA2-BE2C-6313081B2D1E}" type="datetimeFigureOut">
               <a:rPr lang="en-US" smtClean="0"/>
-              <a:t>9/24/2016</a:t>
+              <a:t>9/25/2016</a:t>
             </a:fld>
             <a:endParaRPr lang="en-US"/>
           </a:p>
@@ -1343,7 +1366,6 @@
               <a:rPr lang="en-US"/>
               <a:t>Click to edit Master title style</a:t>
             </a:r>
-            <a:endParaRPr lang="en-US"/>
           </a:p>
         </p:txBody>
       </p:sp>
@@ -1465,7 +1487,6 @@
               <a:rPr lang="en-US"/>
               <a:t>Fifth level</a:t>
             </a:r>
-            <a:endParaRPr lang="en-US"/>
           </a:p>
         </p:txBody>
       </p:sp>
@@ -1587,7 +1608,6 @@
               <a:rPr lang="en-US"/>
               <a:t>Fifth level</a:t>
             </a:r>
-            <a:endParaRPr lang="en-US"/>
           </a:p>
         </p:txBody>
       </p:sp>
@@ -1608,7 +1628,7 @@
           <a:p>
             <a:fld id="{4D11C841-3C48-4AA2-BE2C-6313081B2D1E}" type="datetimeFigureOut">
               <a:rPr lang="en-US" smtClean="0"/>
-              <a:t>9/24/2016</a:t>
+              <a:t>9/25/2016</a:t>
             </a:fld>
             <a:endParaRPr lang="en-US"/>
           </a:p>
@@ -1705,7 +1725,6 @@
               <a:rPr lang="en-US"/>
               <a:t>Click to edit Master title style</a:t>
             </a:r>
-            <a:endParaRPr lang="en-US"/>
           </a:p>
         </p:txBody>
       </p:sp>
@@ -1726,7 +1745,7 @@
           <a:p>
             <a:fld id="{4D11C841-3C48-4AA2-BE2C-6313081B2D1E}" type="datetimeFigureOut">
               <a:rPr lang="en-US" smtClean="0"/>
-              <a:t>9/24/2016</a:t>
+              <a:t>9/25/2016</a:t>
             </a:fld>
             <a:endParaRPr lang="en-US"/>
           </a:p>
@@ -1821,7 +1840,7 @@
           <a:p>
             <a:fld id="{4D11C841-3C48-4AA2-BE2C-6313081B2D1E}" type="datetimeFigureOut">
               <a:rPr lang="en-US" smtClean="0"/>
-              <a:t>9/24/2016</a:t>
+              <a:t>9/25/2016</a:t>
             </a:fld>
             <a:endParaRPr lang="en-US"/>
           </a:p>
@@ -1927,7 +1946,6 @@
               <a:rPr lang="en-US"/>
               <a:t>Click to edit Master title style</a:t>
             </a:r>
-            <a:endParaRPr lang="en-US"/>
           </a:p>
         </p:txBody>
       </p:sp>
@@ -2012,7 +2030,6 @@
               <a:rPr lang="en-US"/>
               <a:t>Fifth level</a:t>
             </a:r>
-            <a:endParaRPr lang="en-US"/>
           </a:p>
         </p:txBody>
       </p:sp>
@@ -2098,7 +2115,7 @@
           <a:p>
             <a:fld id="{4D11C841-3C48-4AA2-BE2C-6313081B2D1E}" type="datetimeFigureOut">
               <a:rPr lang="en-US" smtClean="0"/>
-              <a:t>9/24/2016</a:t>
+              <a:t>9/25/2016</a:t>
             </a:fld>
             <a:endParaRPr lang="en-US"/>
           </a:p>
@@ -2204,7 +2221,6 @@
               <a:rPr lang="en-US"/>
               <a:t>Click to edit Master title style</a:t>
             </a:r>
-            <a:endParaRPr lang="en-US"/>
           </a:p>
         </p:txBody>
       </p:sp>
@@ -2351,7 +2367,7 @@
           <a:p>
             <a:fld id="{4D11C841-3C48-4AA2-BE2C-6313081B2D1E}" type="datetimeFigureOut">
               <a:rPr lang="en-US" smtClean="0"/>
-              <a:t>9/24/2016</a:t>
+              <a:t>9/25/2016</a:t>
             </a:fld>
             <a:endParaRPr lang="en-US"/>
           </a:p>
@@ -2463,7 +2479,6 @@
               <a:rPr lang="en-US"/>
               <a:t>Click to edit Master title style</a:t>
             </a:r>
-            <a:endParaRPr lang="en-US"/>
           </a:p>
         </p:txBody>
       </p:sp>
@@ -2525,7 +2540,6 @@
               <a:rPr lang="en-US"/>
               <a:t>Fifth level</a:t>
             </a:r>
-            <a:endParaRPr lang="en-US"/>
           </a:p>
         </p:txBody>
       </p:sp>
@@ -2564,7 +2578,7 @@
           <a:p>
             <a:fld id="{4D11C841-3C48-4AA2-BE2C-6313081B2D1E}" type="datetimeFigureOut">
               <a:rPr lang="en-US" smtClean="0"/>
-              <a:t>9/24/2016</a:t>
+              <a:t>9/25/2016</a:t>
             </a:fld>
             <a:endParaRPr lang="en-US"/>
           </a:p>
@@ -2971,60 +2985,12 @@
       </p:grpSpPr>
       <p:sp>
         <p:nvSpPr>
-          <p:cNvPr id="15" name="Rectangle 14"/>
-          <p:cNvSpPr/>
-          <p:nvPr/>
-        </p:nvSpPr>
-        <p:spPr>
-          <a:xfrm>
-            <a:off x="524256" y="1377696"/>
-            <a:ext cx="9156192" cy="5010912"/>
-          </a:xfrm>
-          <a:prstGeom prst="rect">
-            <a:avLst/>
-          </a:prstGeom>
-          <a:solidFill>
-            <a:schemeClr val="bg1">
-              <a:lumMod val="85000"/>
-            </a:schemeClr>
-          </a:solidFill>
-          <a:ln>
-            <a:noFill/>
-          </a:ln>
-        </p:spPr>
-        <p:style>
-          <a:lnRef idx="2">
-            <a:schemeClr val="accent1">
-              <a:shade val="50000"/>
-            </a:schemeClr>
-          </a:lnRef>
-          <a:fillRef idx="1">
-            <a:schemeClr val="accent1"/>
-          </a:fillRef>
-          <a:effectRef idx="0">
-            <a:schemeClr val="accent1"/>
-          </a:effectRef>
-          <a:fontRef idx="minor">
-            <a:schemeClr val="lt1"/>
-          </a:fontRef>
-        </p:style>
-        <p:txBody>
-          <a:bodyPr rtlCol="0" anchor="ctr"/>
-          <a:lstStyle/>
-          <a:p>
-            <a:pPr algn="ctr"/>
-            <a:endParaRPr lang="en-US"/>
-          </a:p>
-        </p:txBody>
-      </p:sp>
-      <p:sp>
-        <p:nvSpPr>
           <p:cNvPr id="2" name="Title 1"/>
           <p:cNvSpPr>
             <a:spLocks noGrp="1"/>
           </p:cNvSpPr>
           <p:nvPr>
-            <p:ph type="title"/>
+            <p:ph type="ctrTitle"/>
           </p:nvPr>
         </p:nvSpPr>
         <p:spPr/>
@@ -3034,447 +3000,29 @@
           <a:p>
             <a:r>
               <a:rPr lang="en-US" dirty="0"/>
-              <a:t>Phototag subcommands</a:t>
-            </a:r>
-          </a:p>
-        </p:txBody>
-      </p:sp>
-      <p:sp>
-        <p:nvSpPr>
-          <p:cNvPr id="4" name="Rectangle 3"/>
-          <p:cNvSpPr/>
-          <p:nvPr/>
-        </p:nvSpPr>
-        <p:spPr>
-          <a:xfrm>
-            <a:off x="963168" y="4582668"/>
-            <a:ext cx="3291840" cy="457200"/>
-          </a:xfrm>
-          <a:prstGeom prst="rect">
-            <a:avLst/>
-          </a:prstGeom>
-          <a:ln>
-            <a:noFill/>
-          </a:ln>
-        </p:spPr>
-        <p:style>
-          <a:lnRef idx="2">
-            <a:schemeClr val="accent1">
-              <a:shade val="50000"/>
-            </a:schemeClr>
-          </a:lnRef>
-          <a:fillRef idx="1">
-            <a:schemeClr val="accent1"/>
-          </a:fillRef>
-          <a:effectRef idx="0">
-            <a:schemeClr val="accent1"/>
-          </a:effectRef>
-          <a:fontRef idx="minor">
-            <a:schemeClr val="lt1"/>
-          </a:fontRef>
-        </p:style>
-        <p:txBody>
-          <a:bodyPr rtlCol="0" anchor="ctr"/>
-          <a:lstStyle/>
-          <a:p>
-            <a:r>
-              <a:rPr lang="en-US" sz="2000" dirty="0">
-                <a:latin typeface="Consolas" panose="020B0609020204030204" pitchFamily="49" charset="0"/>
-              </a:rPr>
-              <a:t>C:\&gt;</a:t>
-            </a:r>
-            <a:r>
-              <a:rPr lang="en-US" sz="2400" dirty="0">
-                <a:latin typeface="Consolas" panose="020B0609020204030204" pitchFamily="49" charset="0"/>
-              </a:rPr>
-              <a:t>phototag </a:t>
-            </a:r>
-            <a:r>
-              <a:rPr lang="en-US" sz="2400" b="1" dirty="0">
-                <a:latin typeface="Consolas" panose="020B0609020204030204" pitchFamily="49" charset="0"/>
-              </a:rPr>
-              <a:t>remove</a:t>
-            </a:r>
-          </a:p>
-        </p:txBody>
-      </p:sp>
-      <p:sp>
-        <p:nvSpPr>
-          <p:cNvPr id="5" name="Rectangle 4"/>
-          <p:cNvSpPr/>
-          <p:nvPr/>
-        </p:nvSpPr>
-        <p:spPr>
-          <a:xfrm>
-            <a:off x="963168" y="5516880"/>
-            <a:ext cx="3291840" cy="457200"/>
-          </a:xfrm>
-          <a:prstGeom prst="rect">
-            <a:avLst/>
-          </a:prstGeom>
-          <a:ln>
-            <a:noFill/>
-          </a:ln>
-        </p:spPr>
-        <p:style>
-          <a:lnRef idx="2">
-            <a:schemeClr val="accent1">
-              <a:shade val="50000"/>
-            </a:schemeClr>
-          </a:lnRef>
-          <a:fillRef idx="1">
-            <a:schemeClr val="accent1"/>
-          </a:fillRef>
-          <a:effectRef idx="0">
-            <a:schemeClr val="accent1"/>
-          </a:effectRef>
-          <a:fontRef idx="minor">
-            <a:schemeClr val="lt1"/>
-          </a:fontRef>
-        </p:style>
-        <p:txBody>
-          <a:bodyPr rtlCol="0" anchor="ctr"/>
-          <a:lstStyle/>
-          <a:p>
-            <a:r>
-              <a:rPr lang="en-US" sz="2000" dirty="0">
-                <a:latin typeface="Consolas" panose="020B0609020204030204" pitchFamily="49" charset="0"/>
-              </a:rPr>
-              <a:t>C:\&gt;</a:t>
-            </a:r>
-            <a:r>
-              <a:rPr lang="en-US" sz="2400" dirty="0">
-                <a:latin typeface="Consolas" panose="020B0609020204030204" pitchFamily="49" charset="0"/>
-              </a:rPr>
-              <a:t>phototag </a:t>
-            </a:r>
-            <a:r>
-              <a:rPr lang="en-US" sz="2400" b="1" dirty="0">
-                <a:latin typeface="Consolas" panose="020B0609020204030204" pitchFamily="49" charset="0"/>
-              </a:rPr>
-              <a:t>search</a:t>
-            </a:r>
-          </a:p>
-        </p:txBody>
-      </p:sp>
-      <p:sp>
-        <p:nvSpPr>
-          <p:cNvPr id="6" name="Rectangle 5"/>
-          <p:cNvSpPr/>
-          <p:nvPr/>
-        </p:nvSpPr>
-        <p:spPr>
-          <a:xfrm>
-            <a:off x="963168" y="2714244"/>
-            <a:ext cx="3291840" cy="457200"/>
-          </a:xfrm>
-          <a:prstGeom prst="rect">
-            <a:avLst/>
-          </a:prstGeom>
-          <a:ln>
-            <a:noFill/>
-          </a:ln>
-        </p:spPr>
-        <p:style>
-          <a:lnRef idx="2">
-            <a:schemeClr val="accent1">
-              <a:shade val="50000"/>
-            </a:schemeClr>
-          </a:lnRef>
-          <a:fillRef idx="1">
-            <a:schemeClr val="accent1"/>
-          </a:fillRef>
-          <a:effectRef idx="0">
-            <a:schemeClr val="accent1"/>
-          </a:effectRef>
-          <a:fontRef idx="minor">
-            <a:schemeClr val="lt1"/>
-          </a:fontRef>
-        </p:style>
-        <p:txBody>
-          <a:bodyPr rtlCol="0" anchor="ctr"/>
-          <a:lstStyle/>
-          <a:p>
-            <a:r>
-              <a:rPr lang="en-US" sz="2000" dirty="0">
-                <a:latin typeface="Consolas" panose="020B0609020204030204" pitchFamily="49" charset="0"/>
-              </a:rPr>
-              <a:t>C:\&gt;</a:t>
-            </a:r>
-            <a:r>
-              <a:rPr lang="en-US" sz="2400" dirty="0">
-                <a:latin typeface="Consolas" panose="020B0609020204030204" pitchFamily="49" charset="0"/>
-              </a:rPr>
-              <a:t>phototag </a:t>
-            </a:r>
-            <a:r>
-              <a:rPr lang="en-US" sz="2400" b="1" dirty="0">
-                <a:latin typeface="Consolas" panose="020B0609020204030204" pitchFamily="49" charset="0"/>
-              </a:rPr>
-              <a:t>view</a:t>
-            </a:r>
-          </a:p>
-        </p:txBody>
-      </p:sp>
-      <p:sp>
-        <p:nvSpPr>
-          <p:cNvPr id="7" name="Rectangle 6"/>
-          <p:cNvSpPr/>
-          <p:nvPr/>
-        </p:nvSpPr>
-        <p:spPr>
-          <a:xfrm>
-            <a:off x="963168" y="3648456"/>
-            <a:ext cx="3291840" cy="457200"/>
-          </a:xfrm>
-          <a:prstGeom prst="rect">
-            <a:avLst/>
-          </a:prstGeom>
-          <a:ln>
-            <a:noFill/>
-          </a:ln>
-        </p:spPr>
-        <p:style>
-          <a:lnRef idx="2">
-            <a:schemeClr val="accent1">
-              <a:shade val="50000"/>
-            </a:schemeClr>
-          </a:lnRef>
-          <a:fillRef idx="1">
-            <a:schemeClr val="accent1"/>
-          </a:fillRef>
-          <a:effectRef idx="0">
-            <a:schemeClr val="accent1"/>
-          </a:effectRef>
-          <a:fontRef idx="minor">
-            <a:schemeClr val="lt1"/>
-          </a:fontRef>
-        </p:style>
-        <p:txBody>
-          <a:bodyPr rtlCol="0" anchor="ctr"/>
-          <a:lstStyle/>
-          <a:p>
-            <a:r>
-              <a:rPr lang="en-US" sz="2000" dirty="0">
-                <a:latin typeface="Consolas" panose="020B0609020204030204" pitchFamily="49" charset="0"/>
-              </a:rPr>
-              <a:t>C:\&gt;</a:t>
-            </a:r>
-            <a:r>
-              <a:rPr lang="en-US" sz="2400" dirty="0">
-                <a:latin typeface="Consolas" panose="020B0609020204030204" pitchFamily="49" charset="0"/>
-              </a:rPr>
-              <a:t>phototag </a:t>
-            </a:r>
-            <a:r>
-              <a:rPr lang="en-US" sz="2400" b="1" dirty="0">
-                <a:latin typeface="Consolas" panose="020B0609020204030204" pitchFamily="49" charset="0"/>
-              </a:rPr>
-              <a:t>add</a:t>
-            </a:r>
-          </a:p>
-        </p:txBody>
-      </p:sp>
-      <p:sp>
-        <p:nvSpPr>
-          <p:cNvPr id="9" name="Rectangle 8"/>
-          <p:cNvSpPr/>
-          <p:nvPr/>
-        </p:nvSpPr>
-        <p:spPr>
-          <a:xfrm>
-            <a:off x="963168" y="1780032"/>
-            <a:ext cx="3291840" cy="457200"/>
-          </a:xfrm>
-          <a:prstGeom prst="rect">
-            <a:avLst/>
-          </a:prstGeom>
-          <a:ln>
-            <a:noFill/>
-          </a:ln>
-        </p:spPr>
-        <p:style>
-          <a:lnRef idx="2">
-            <a:schemeClr val="accent1">
-              <a:shade val="50000"/>
-            </a:schemeClr>
-          </a:lnRef>
-          <a:fillRef idx="1">
-            <a:schemeClr val="accent1"/>
-          </a:fillRef>
-          <a:effectRef idx="0">
-            <a:schemeClr val="accent1"/>
-          </a:effectRef>
-          <a:fontRef idx="minor">
-            <a:schemeClr val="lt1"/>
-          </a:fontRef>
-        </p:style>
-        <p:txBody>
-          <a:bodyPr rtlCol="0" anchor="ctr"/>
-          <a:lstStyle/>
-          <a:p>
-            <a:r>
-              <a:rPr lang="en-US" sz="2000" dirty="0">
-                <a:latin typeface="Consolas" panose="020B0609020204030204" pitchFamily="49" charset="0"/>
-              </a:rPr>
-              <a:t>C:\&gt;</a:t>
-            </a:r>
-            <a:r>
-              <a:rPr lang="en-US" sz="2400" dirty="0">
-                <a:latin typeface="Consolas" panose="020B0609020204030204" pitchFamily="49" charset="0"/>
-              </a:rPr>
-              <a:t>phototag </a:t>
-            </a:r>
-            <a:r>
-              <a:rPr lang="en-US" sz="2400" b="1" dirty="0">
-                <a:latin typeface="Consolas" panose="020B0609020204030204" pitchFamily="49" charset="0"/>
-              </a:rPr>
-              <a:t>config</a:t>
-            </a:r>
-          </a:p>
-        </p:txBody>
-      </p:sp>
-      <p:sp>
-        <p:nvSpPr>
-          <p:cNvPr id="10" name="TextBox 9"/>
-          <p:cNvSpPr txBox="1"/>
-          <p:nvPr/>
-        </p:nvSpPr>
-        <p:spPr>
-          <a:xfrm>
-            <a:off x="4364736" y="1853184"/>
-            <a:ext cx="1728358" cy="369332"/>
-          </a:xfrm>
-          <a:prstGeom prst="rect">
-            <a:avLst/>
-          </a:prstGeom>
-          <a:noFill/>
-        </p:spPr>
-        <p:txBody>
-          <a:bodyPr wrap="none" rtlCol="0">
-            <a:spAutoFit/>
-          </a:bodyPr>
+              <a:t>phototag</a:t>
+            </a:r>
+          </a:p>
+        </p:txBody>
+      </p:sp>
+      <p:sp>
+        <p:nvSpPr>
+          <p:cNvPr id="3" name="Subtitle 2"/>
+          <p:cNvSpPr>
+            <a:spLocks noGrp="1"/>
+          </p:cNvSpPr>
+          <p:nvPr>
+            <p:ph type="subTitle" idx="1"/>
+          </p:nvPr>
+        </p:nvSpPr>
+        <p:spPr/>
+        <p:txBody>
+          <a:bodyPr/>
           <a:lstStyle/>
           <a:p>
             <a:r>
               <a:rPr lang="en-US" dirty="0"/>
-              <a:t>Manage settings</a:t>
-            </a:r>
-          </a:p>
-        </p:txBody>
-      </p:sp>
-      <p:sp>
-        <p:nvSpPr>
-          <p:cNvPr id="11" name="TextBox 10"/>
-          <p:cNvSpPr txBox="1"/>
-          <p:nvPr/>
-        </p:nvSpPr>
-        <p:spPr>
-          <a:xfrm>
-            <a:off x="4364736" y="5590032"/>
-            <a:ext cx="1249253" cy="369332"/>
-          </a:xfrm>
-          <a:prstGeom prst="rect">
-            <a:avLst/>
-          </a:prstGeom>
-          <a:noFill/>
-        </p:spPr>
-        <p:txBody>
-          <a:bodyPr wrap="none" rtlCol="0">
-            <a:spAutoFit/>
-          </a:bodyPr>
-          <a:lstStyle/>
-          <a:p>
-            <a:r>
-              <a:rPr lang="en-US" dirty="0"/>
-              <a:t>Search tags</a:t>
-            </a:r>
-          </a:p>
-        </p:txBody>
-      </p:sp>
-      <p:sp>
-        <p:nvSpPr>
-          <p:cNvPr id="12" name="TextBox 11"/>
-          <p:cNvSpPr txBox="1"/>
-          <p:nvPr/>
-        </p:nvSpPr>
-        <p:spPr>
-          <a:xfrm>
-            <a:off x="4364736" y="4655820"/>
-            <a:ext cx="3530005" cy="369332"/>
-          </a:xfrm>
-          <a:prstGeom prst="rect">
-            <a:avLst/>
-          </a:prstGeom>
-          <a:noFill/>
-        </p:spPr>
-        <p:txBody>
-          <a:bodyPr wrap="none" rtlCol="0">
-            <a:spAutoFit/>
-          </a:bodyPr>
-          <a:lstStyle/>
-          <a:p>
-            <a:r>
-              <a:rPr lang="en-US" dirty="0"/>
-              <a:t>Remove tags from a folder or photo</a:t>
-            </a:r>
-          </a:p>
-        </p:txBody>
-      </p:sp>
-      <p:sp>
-        <p:nvSpPr>
-          <p:cNvPr id="13" name="TextBox 12"/>
-          <p:cNvSpPr txBox="1"/>
-          <p:nvPr/>
-        </p:nvSpPr>
-        <p:spPr>
-          <a:xfrm>
-            <a:off x="4364736" y="3721608"/>
-            <a:ext cx="2891176" cy="369332"/>
-          </a:xfrm>
-          <a:prstGeom prst="rect">
-            <a:avLst/>
-          </a:prstGeom>
-          <a:noFill/>
-        </p:spPr>
-        <p:txBody>
-          <a:bodyPr wrap="none" rtlCol="0">
-            <a:spAutoFit/>
-          </a:bodyPr>
-          <a:lstStyle/>
-          <a:p>
-            <a:r>
-              <a:rPr lang="en-US" dirty="0"/>
-              <a:t>Add tags to a folder or photo</a:t>
-            </a:r>
-          </a:p>
-        </p:txBody>
-      </p:sp>
-      <p:sp>
-        <p:nvSpPr>
-          <p:cNvPr id="14" name="TextBox 13"/>
-          <p:cNvSpPr txBox="1"/>
-          <p:nvPr/>
-        </p:nvSpPr>
-        <p:spPr>
-          <a:xfrm>
-            <a:off x="4364736" y="2787396"/>
-            <a:ext cx="3049296" cy="369332"/>
-          </a:xfrm>
-          <a:prstGeom prst="rect">
-            <a:avLst/>
-          </a:prstGeom>
-          <a:noFill/>
-        </p:spPr>
-        <p:txBody>
-          <a:bodyPr wrap="none" rtlCol="0">
-            <a:spAutoFit/>
-          </a:bodyPr>
-          <a:lstStyle/>
-          <a:p>
-            <a:r>
-              <a:rPr lang="en-US" dirty="0"/>
-              <a:t>View tags for a folder or photo</a:t>
+              <a:t>Tools for managing photo tags</a:t>
             </a:r>
           </a:p>
         </p:txBody>
@@ -3482,7 +3030,7 @@
     </p:spTree>
     <p:extLst>
       <p:ext uri="{BB962C8B-B14F-4D97-AF65-F5344CB8AC3E}">
-        <p14:creationId xmlns:p14="http://schemas.microsoft.com/office/powerpoint/2010/main" val="1164994439"/>
+        <p14:creationId xmlns:p14="http://schemas.microsoft.com/office/powerpoint/2010/main" val="1931112623"/>
       </p:ext>
     </p:extLst>
   </p:cSld>
@@ -3492,7 +3040,7 @@
 </p:sld>
 </file>
 
-<file path=ppt/slides/slide2.xml><?xml version="1.0" encoding="utf-8"?>
+<file path=ppt/slides/slide10.xml><?xml version="1.0" encoding="utf-8"?>
 <p:sld xmlns:a="http://schemas.openxmlformats.org/drawingml/2006/main" xmlns:r="http://schemas.openxmlformats.org/officeDocument/2006/relationships" xmlns:p="http://schemas.openxmlformats.org/presentationml/2006/main">
   <p:cSld>
     <p:bg>
@@ -3548,7 +3096,7 @@
                 </a:solidFill>
                 <a:latin typeface="Consolas" panose="020B0609020204030204" pitchFamily="49" charset="0"/>
               </a:rPr>
-              <a:t>C:\&gt;phototag </a:t>
+              <a:t>C:\&gt;</a:t>
             </a:r>
             <a:r>
               <a:rPr lang="en-US" sz="2800" b="1" dirty="0">
@@ -3560,7 +3108,7 @@
                 </a:solidFill>
                 <a:latin typeface="Consolas" panose="020B0609020204030204" pitchFamily="49" charset="0"/>
               </a:rPr>
-              <a:t>config</a:t>
+              <a:t>phototag search</a:t>
             </a:r>
             <a:r>
               <a:rPr lang="en-US" sz="2800" b="1" dirty="0">
@@ -3579,6 +3127,63 @@
                 <a:latin typeface="Consolas" panose="020B0609020204030204" pitchFamily="49" charset="0"/>
               </a:rPr>
               <a:t>–h</a:t>
+            </a:r>
+          </a:p>
+          <a:p>
+            <a:r>
+              <a:rPr lang="en-US" sz="2800" dirty="0">
+                <a:solidFill>
+                  <a:schemeClr val="bg1"/>
+                </a:solidFill>
+                <a:latin typeface="Consolas" panose="020B0609020204030204" pitchFamily="49" charset="0"/>
+              </a:rPr>
+              <a:t>Usage: phototag search [OPTIONS]</a:t>
+            </a:r>
+          </a:p>
+          <a:p>
+            <a:endParaRPr lang="en-US" sz="2800" b="1" dirty="0">
+              <a:solidFill>
+                <a:schemeClr val="accent1">
+                  <a:lumMod val="60000"/>
+                  <a:lumOff val="40000"/>
+                </a:schemeClr>
+              </a:solidFill>
+              <a:latin typeface="Consolas" panose="020B0609020204030204" pitchFamily="49" charset="0"/>
+            </a:endParaRPr>
+          </a:p>
+          <a:p>
+            <a:r>
+              <a:rPr lang="en-US" sz="2800" b="1" dirty="0">
+                <a:solidFill>
+                  <a:schemeClr val="accent1">
+                    <a:lumMod val="60000"/>
+                    <a:lumOff val="40000"/>
+                  </a:schemeClr>
+                </a:solidFill>
+                <a:latin typeface="Consolas" panose="020B0609020204030204" pitchFamily="49" charset="0"/>
+              </a:rPr>
+              <a:t> </a:t>
+            </a:r>
+            <a:r>
+              <a:rPr lang="en-US" sz="2800" dirty="0">
+                <a:solidFill>
+                  <a:schemeClr val="bg1"/>
+                </a:solidFill>
+                <a:latin typeface="Consolas" panose="020B0609020204030204" pitchFamily="49" charset="0"/>
+              </a:rPr>
+              <a:t> </a:t>
+            </a:r>
+            <a:r>
+              <a:rPr lang="en-US" sz="2800" b="1" dirty="0">
+                <a:solidFill>
+                  <a:schemeClr val="accent1">
+                    <a:lumMod val="60000"/>
+                    <a:lumOff val="40000"/>
+                  </a:schemeClr>
+                </a:solidFill>
+                <a:latin typeface="Consolas" panose="020B0609020204030204" pitchFamily="49" charset="0"/>
+              </a:rPr>
+              <a:t>Search tags</a:t>
             </a:r>
           </a:p>
           <a:p>
@@ -3597,7 +3202,69 @@
                 </a:solidFill>
                 <a:latin typeface="Consolas" panose="020B0609020204030204" pitchFamily="49" charset="0"/>
               </a:rPr>
-              <a:t>Usage: phototag config [OPTIONS]</a:t>
+              <a:t>Options:</a:t>
+            </a:r>
+          </a:p>
+          <a:p>
+            <a:r>
+              <a:rPr lang="en-US" sz="2800" dirty="0">
+                <a:solidFill>
+                  <a:schemeClr val="bg1"/>
+                </a:solidFill>
+                <a:latin typeface="Consolas" panose="020B0609020204030204" pitchFamily="49" charset="0"/>
+              </a:rPr>
+              <a:t>  -t, --tags &lt;str&gt;      tags (tag1/tag2/</a:t>
+            </a:r>
+            <a:r>
+              <a:rPr lang="en-US" sz="2800" dirty="0" err="1">
+                <a:solidFill>
+                  <a:schemeClr val="bg1"/>
+                </a:solidFill>
+                <a:latin typeface="Consolas" panose="020B0609020204030204" pitchFamily="49" charset="0"/>
+              </a:rPr>
+              <a:t>etc</a:t>
+            </a:r>
+            <a:r>
+              <a:rPr lang="en-US" sz="2800" dirty="0">
+                <a:solidFill>
+                  <a:schemeClr val="bg1"/>
+                </a:solidFill>
+                <a:latin typeface="Consolas" panose="020B0609020204030204" pitchFamily="49" charset="0"/>
+              </a:rPr>
+              <a:t>)</a:t>
+            </a:r>
+          </a:p>
+          <a:p>
+            <a:r>
+              <a:rPr lang="en-US" sz="2800" dirty="0">
+                <a:solidFill>
+                  <a:schemeClr val="bg1"/>
+                </a:solidFill>
+                <a:latin typeface="Consolas" panose="020B0609020204030204" pitchFamily="49" charset="0"/>
+              </a:rPr>
+              <a:t>  -o/-a, --or/--and     and/or flag (default=and)</a:t>
+            </a:r>
+          </a:p>
+          <a:p>
+            <a:r>
+              <a:rPr lang="en-US" sz="2800" dirty="0">
+                <a:solidFill>
+                  <a:schemeClr val="bg1"/>
+                </a:solidFill>
+                <a:latin typeface="Consolas" panose="020B0609020204030204" pitchFamily="49" charset="0"/>
+              </a:rPr>
+              <a:t>  -f, --folder &lt;str&gt;    folder</a:t>
+            </a:r>
+          </a:p>
+          <a:p>
+            <a:r>
+              <a:rPr lang="en-US" sz="2800" dirty="0">
+                <a:solidFill>
+                  <a:schemeClr val="bg1"/>
+                </a:solidFill>
+                <a:latin typeface="Consolas" panose="020B0609020204030204" pitchFamily="49" charset="0"/>
+              </a:rPr>
+              <a:t>  -h, --help            Show this message and exit.</a:t>
             </a:r>
           </a:p>
           <a:p>
@@ -3616,128 +3283,15 @@
                 </a:solidFill>
                 <a:latin typeface="Consolas" panose="020B0609020204030204" pitchFamily="49" charset="0"/>
               </a:rPr>
-              <a:t>  Manage settings</a:t>
-            </a:r>
-          </a:p>
-          <a:p>
-            <a:endParaRPr lang="en-US" sz="2800" dirty="0">
-              <a:solidFill>
-                <a:schemeClr val="bg1"/>
-              </a:solidFill>
-              <a:latin typeface="Consolas" panose="020B0609020204030204" pitchFamily="49" charset="0"/>
-            </a:endParaRPr>
-          </a:p>
-          <a:p>
-            <a:r>
-              <a:rPr lang="en-US" sz="2800" dirty="0">
-                <a:solidFill>
-                  <a:schemeClr val="bg1"/>
-                </a:solidFill>
-                <a:latin typeface="Consolas" panose="020B0609020204030204" pitchFamily="49" charset="0"/>
-              </a:rPr>
-              <a:t>Options:</a:t>
-            </a:r>
-          </a:p>
-          <a:p>
-            <a:r>
-              <a:rPr lang="en-US" sz="2800" dirty="0">
-                <a:solidFill>
-                  <a:schemeClr val="bg1"/>
-                </a:solidFill>
-                <a:latin typeface="Consolas" panose="020B0609020204030204" pitchFamily="49" charset="0"/>
-              </a:rPr>
-              <a:t>  -v, --view &lt;</a:t>
-            </a:r>
-            <a:r>
-              <a:rPr lang="en-US" sz="2800" dirty="0" err="1">
-                <a:solidFill>
-                  <a:schemeClr val="bg1"/>
-                </a:solidFill>
-                <a:latin typeface="Consolas" panose="020B0609020204030204" pitchFamily="49" charset="0"/>
-              </a:rPr>
-              <a:t>str</a:t>
-            </a:r>
-            <a:r>
-              <a:rPr lang="en-US" sz="2800" dirty="0">
-                <a:solidFill>
-                  <a:schemeClr val="bg1"/>
-                </a:solidFill>
-                <a:latin typeface="Consolas" panose="020B0609020204030204" pitchFamily="49" charset="0"/>
-              </a:rPr>
-              <a:t>&gt;      view all config settings</a:t>
-            </a:r>
-          </a:p>
-          <a:p>
-            <a:r>
-              <a:rPr lang="en-US" sz="2800" dirty="0">
-                <a:solidFill>
-                  <a:schemeClr val="bg1"/>
-                </a:solidFill>
-                <a:latin typeface="Consolas" panose="020B0609020204030204" pitchFamily="49" charset="0"/>
-              </a:rPr>
-              <a:t>  -f, --folder &lt;</a:t>
-            </a:r>
-            <a:r>
-              <a:rPr lang="en-US" sz="2800" dirty="0" err="1">
-                <a:solidFill>
-                  <a:schemeClr val="bg1"/>
-                </a:solidFill>
-                <a:latin typeface="Consolas" panose="020B0609020204030204" pitchFamily="49" charset="0"/>
-              </a:rPr>
-              <a:t>str</a:t>
-            </a:r>
-            <a:r>
-              <a:rPr lang="en-US" sz="2800" dirty="0">
-                <a:solidFill>
-                  <a:schemeClr val="bg1"/>
-                </a:solidFill>
-                <a:latin typeface="Consolas" panose="020B0609020204030204" pitchFamily="49" charset="0"/>
-              </a:rPr>
-              <a:t>&gt;    set location of photos folder</a:t>
-            </a:r>
-          </a:p>
-          <a:p>
-            <a:r>
-              <a:rPr lang="en-US" sz="2800" dirty="0">
-                <a:solidFill>
-                  <a:schemeClr val="bg1"/>
-                </a:solidFill>
-                <a:latin typeface="Consolas" panose="020B0609020204030204" pitchFamily="49" charset="0"/>
-              </a:rPr>
-              <a:t>  -h, --help            Show this message and exit.</a:t>
-            </a:r>
-          </a:p>
-          <a:p>
-            <a:endParaRPr lang="en-US" sz="2800" dirty="0">
-              <a:solidFill>
-                <a:schemeClr val="bg1"/>
-              </a:solidFill>
-              <a:latin typeface="Consolas" panose="020B0609020204030204" pitchFamily="49" charset="0"/>
-            </a:endParaRPr>
-          </a:p>
-          <a:p>
-            <a:r>
-              <a:rPr lang="en-US" sz="2800" dirty="0">
-                <a:solidFill>
-                  <a:schemeClr val="bg1"/>
-                </a:solidFill>
-                <a:latin typeface="Consolas" panose="020B0609020204030204" pitchFamily="49" charset="0"/>
-              </a:rPr>
               <a:t>C:\&gt;</a:t>
             </a:r>
-            <a:endParaRPr lang="en-US" sz="2800" dirty="0">
-              <a:solidFill>
-                <a:schemeClr val="bg1"/>
-              </a:solidFill>
-              <a:latin typeface="Consolas" panose="020B0609020204030204" pitchFamily="49" charset="0"/>
-            </a:endParaRPr>
           </a:p>
         </p:txBody>
       </p:sp>
     </p:spTree>
     <p:extLst>
       <p:ext uri="{BB962C8B-B14F-4D97-AF65-F5344CB8AC3E}">
-        <p14:creationId xmlns:p14="http://schemas.microsoft.com/office/powerpoint/2010/main" val="742271513"/>
+        <p14:creationId xmlns:p14="http://schemas.microsoft.com/office/powerpoint/2010/main" val="2839809489"/>
       </p:ext>
     </p:extLst>
   </p:cSld>
@@ -3747,17 +3301,9 @@
 </p:sld>
 </file>
 
-<file path=ppt/slides/slide3.xml><?xml version="1.0" encoding="utf-8"?>
+<file path=ppt/slides/slide2.xml><?xml version="1.0" encoding="utf-8"?>
 <p:sld xmlns:a="http://schemas.openxmlformats.org/drawingml/2006/main" xmlns:r="http://schemas.openxmlformats.org/officeDocument/2006/relationships" xmlns:p="http://schemas.openxmlformats.org/presentationml/2006/main">
   <p:cSld>
-    <p:bg>
-      <p:bgPr>
-        <a:solidFill>
-          <a:schemeClr val="tx1"/>
-        </a:solidFill>
-        <a:effectLst/>
-      </p:bgPr>
-    </p:bg>
     <p:spTree>
       <p:nvGrpSpPr>
         <p:cNvPr id="1" name=""/>
@@ -3774,225 +3320,52 @@
       </p:grpSpPr>
       <p:sp>
         <p:nvSpPr>
-          <p:cNvPr id="5" name="Rectangle 4"/>
-          <p:cNvSpPr/>
-          <p:nvPr/>
-        </p:nvSpPr>
-        <p:spPr>
-          <a:xfrm>
-            <a:off x="573024" y="426720"/>
-            <a:ext cx="11021568" cy="5262979"/>
-          </a:xfrm>
-          <a:prstGeom prst="rect">
-            <a:avLst/>
-          </a:prstGeom>
-          <a:solidFill>
-            <a:schemeClr val="tx1"/>
-          </a:solidFill>
-        </p:spPr>
-        <p:txBody>
-          <a:bodyPr wrap="square">
-            <a:spAutoFit/>
-          </a:bodyPr>
-          <a:lstStyle/>
-          <a:p>
-            <a:r>
-              <a:rPr lang="en-US" sz="2800" dirty="0">
-                <a:solidFill>
-                  <a:schemeClr val="bg1"/>
-                </a:solidFill>
-                <a:latin typeface="Consolas" panose="020B0609020204030204" pitchFamily="49" charset="0"/>
-              </a:rPr>
-              <a:t>C:\&gt;phototag </a:t>
-            </a:r>
-            <a:r>
-              <a:rPr lang="en-US" sz="2800" b="1" dirty="0">
-                <a:solidFill>
-                  <a:schemeClr val="accent1">
-                    <a:lumMod val="60000"/>
-                    <a:lumOff val="40000"/>
-                  </a:schemeClr>
-                </a:solidFill>
-                <a:latin typeface="Consolas" panose="020B0609020204030204" pitchFamily="49" charset="0"/>
-              </a:rPr>
-              <a:t>view</a:t>
-            </a:r>
-            <a:r>
-              <a:rPr lang="en-US" sz="2800" b="1" dirty="0">
-                <a:solidFill>
-                  <a:schemeClr val="bg1"/>
-                </a:solidFill>
-                <a:latin typeface="Consolas" panose="020B0609020204030204" pitchFamily="49" charset="0"/>
-              </a:rPr>
-              <a:t> </a:t>
-            </a:r>
-            <a:r>
-              <a:rPr lang="en-US" sz="2800" dirty="0">
-                <a:solidFill>
-                  <a:schemeClr val="bg1"/>
-                </a:solidFill>
-                <a:latin typeface="Consolas" panose="020B0609020204030204" pitchFamily="49" charset="0"/>
-              </a:rPr>
-              <a:t>–h</a:t>
-            </a:r>
-          </a:p>
-          <a:p>
-            <a:endParaRPr lang="en-US" sz="2800" dirty="0">
-              <a:solidFill>
-                <a:schemeClr val="bg1"/>
-              </a:solidFill>
-              <a:latin typeface="Consolas" panose="020B0609020204030204" pitchFamily="49" charset="0"/>
-            </a:endParaRPr>
-          </a:p>
-          <a:p>
-            <a:r>
-              <a:rPr lang="en-US" sz="2800" dirty="0">
-                <a:solidFill>
-                  <a:schemeClr val="bg1"/>
-                </a:solidFill>
-                <a:latin typeface="Consolas" panose="020B0609020204030204" pitchFamily="49" charset="0"/>
-              </a:rPr>
-              <a:t>Usage: phototag view [OPTIONS]</a:t>
-            </a:r>
-          </a:p>
-          <a:p>
-            <a:endParaRPr lang="en-US" sz="2800" dirty="0">
-              <a:solidFill>
-                <a:schemeClr val="bg1"/>
-              </a:solidFill>
-              <a:latin typeface="Consolas" panose="020B0609020204030204" pitchFamily="49" charset="0"/>
-            </a:endParaRPr>
-          </a:p>
-          <a:p>
-            <a:r>
-              <a:rPr lang="en-US" sz="2800" dirty="0">
-                <a:solidFill>
-                  <a:schemeClr val="bg1"/>
-                </a:solidFill>
-                <a:latin typeface="Consolas" panose="020B0609020204030204" pitchFamily="49" charset="0"/>
-              </a:rPr>
-              <a:t>  View tags for a folder or photo</a:t>
-            </a:r>
-          </a:p>
-          <a:p>
-            <a:endParaRPr lang="en-US" sz="2800" dirty="0">
-              <a:solidFill>
-                <a:schemeClr val="bg1"/>
-              </a:solidFill>
-              <a:latin typeface="Consolas" panose="020B0609020204030204" pitchFamily="49" charset="0"/>
-            </a:endParaRPr>
-          </a:p>
-          <a:p>
-            <a:r>
-              <a:rPr lang="en-US" sz="2800" dirty="0">
-                <a:solidFill>
-                  <a:schemeClr val="bg1"/>
-                </a:solidFill>
-                <a:latin typeface="Consolas" panose="020B0609020204030204" pitchFamily="49" charset="0"/>
-              </a:rPr>
-              <a:t>Options:</a:t>
-            </a:r>
-          </a:p>
-          <a:p>
-            <a:r>
-              <a:rPr lang="en-US" sz="2800" dirty="0">
-                <a:solidFill>
-                  <a:schemeClr val="bg1"/>
-                </a:solidFill>
-                <a:latin typeface="Consolas" panose="020B0609020204030204" pitchFamily="49" charset="0"/>
-              </a:rPr>
-              <a:t>  -f, --folder &lt;</a:t>
-            </a:r>
-            <a:r>
-              <a:rPr lang="en-US" sz="2800" dirty="0" err="1">
-                <a:solidFill>
-                  <a:schemeClr val="bg1"/>
-                </a:solidFill>
-                <a:latin typeface="Consolas" panose="020B0609020204030204" pitchFamily="49" charset="0"/>
-              </a:rPr>
-              <a:t>str</a:t>
-            </a:r>
-            <a:r>
-              <a:rPr lang="en-US" sz="2800" dirty="0">
-                <a:solidFill>
-                  <a:schemeClr val="bg1"/>
-                </a:solidFill>
-                <a:latin typeface="Consolas" panose="020B0609020204030204" pitchFamily="49" charset="0"/>
-              </a:rPr>
-              <a:t>&gt;    folder</a:t>
-            </a:r>
-          </a:p>
-          <a:p>
-            <a:r>
-              <a:rPr lang="en-US" sz="2800" dirty="0">
-                <a:solidFill>
-                  <a:schemeClr val="bg1"/>
-                </a:solidFill>
-                <a:latin typeface="Consolas" panose="020B0609020204030204" pitchFamily="49" charset="0"/>
-              </a:rPr>
-              <a:t>  -p, --photo &lt;</a:t>
-            </a:r>
-            <a:r>
-              <a:rPr lang="en-US" sz="2800" dirty="0" err="1">
-                <a:solidFill>
-                  <a:schemeClr val="bg1"/>
-                </a:solidFill>
-                <a:latin typeface="Consolas" panose="020B0609020204030204" pitchFamily="49" charset="0"/>
-              </a:rPr>
-              <a:t>str</a:t>
-            </a:r>
-            <a:r>
-              <a:rPr lang="en-US" sz="2800" dirty="0">
-                <a:solidFill>
-                  <a:schemeClr val="bg1"/>
-                </a:solidFill>
-                <a:latin typeface="Consolas" panose="020B0609020204030204" pitchFamily="49" charset="0"/>
-              </a:rPr>
-              <a:t>&gt;     photo (filename)</a:t>
-            </a:r>
-          </a:p>
-          <a:p>
-            <a:r>
-              <a:rPr lang="en-US" sz="2800" dirty="0">
-                <a:solidFill>
-                  <a:schemeClr val="bg1"/>
-                </a:solidFill>
-                <a:latin typeface="Consolas" panose="020B0609020204030204" pitchFamily="49" charset="0"/>
-              </a:rPr>
-              <a:t>  -h, --help            Show this message and exit.</a:t>
-            </a:r>
-          </a:p>
-          <a:p>
-            <a:endParaRPr lang="en-US" sz="2800" dirty="0">
-              <a:solidFill>
-                <a:schemeClr val="bg1"/>
-              </a:solidFill>
-              <a:latin typeface="Consolas" panose="020B0609020204030204" pitchFamily="49" charset="0"/>
-            </a:endParaRPr>
-          </a:p>
-          <a:p>
-            <a:r>
-              <a:rPr lang="en-US" sz="2800" dirty="0">
-                <a:solidFill>
-                  <a:schemeClr val="bg1"/>
-                </a:solidFill>
-                <a:latin typeface="Consolas" panose="020B0609020204030204" pitchFamily="49" charset="0"/>
-              </a:rPr>
-              <a:t>C:\&gt;</a:t>
-            </a:r>
-            <a:endParaRPr lang="en-US" sz="2800" dirty="0">
-              <a:solidFill>
-                <a:schemeClr val="bg1"/>
-              </a:solidFill>
-              <a:latin typeface="Consolas" panose="020B0609020204030204" pitchFamily="49" charset="0"/>
-            </a:endParaRPr>
+          <p:cNvPr id="2" name="Title 1"/>
+          <p:cNvSpPr>
+            <a:spLocks noGrp="1"/>
+          </p:cNvSpPr>
+          <p:nvPr>
+            <p:ph type="title"/>
+          </p:nvPr>
+        </p:nvSpPr>
+        <p:spPr/>
+        <p:txBody>
+          <a:bodyPr/>
+          <a:lstStyle/>
+          <a:p>
+            <a:r>
+              <a:rPr lang="en-US" dirty="0"/>
+              <a:t>Data Structure</a:t>
+            </a:r>
+          </a:p>
+        </p:txBody>
+      </p:sp>
+      <p:sp>
+        <p:nvSpPr>
+          <p:cNvPr id="3" name="Text Placeholder 2"/>
+          <p:cNvSpPr>
+            <a:spLocks noGrp="1"/>
+          </p:cNvSpPr>
+          <p:nvPr>
+            <p:ph type="body" idx="1"/>
+          </p:nvPr>
+        </p:nvSpPr>
+        <p:spPr/>
+        <p:txBody>
+          <a:bodyPr/>
+          <a:lstStyle/>
+          <a:p>
+            <a:r>
+              <a:rPr lang="en-US" dirty="0"/>
+              <a:t>Tags are stored in text files within the same folder as the photo(s) they apply to.</a:t>
+            </a:r>
           </a:p>
         </p:txBody>
       </p:sp>
     </p:spTree>
     <p:extLst>
       <p:ext uri="{BB962C8B-B14F-4D97-AF65-F5344CB8AC3E}">
-        <p14:creationId xmlns:p14="http://schemas.microsoft.com/office/powerpoint/2010/main" val="3181880333"/>
+        <p14:creationId xmlns:p14="http://schemas.microsoft.com/office/powerpoint/2010/main" val="1107094111"/>
       </p:ext>
     </p:extLst>
   </p:cSld>
@@ -4002,17 +3375,9 @@
 </p:sld>
 </file>
 
-<file path=ppt/slides/slide4.xml><?xml version="1.0" encoding="utf-8"?>
+<file path=ppt/slides/slide3.xml><?xml version="1.0" encoding="utf-8"?>
 <p:sld xmlns:a="http://schemas.openxmlformats.org/drawingml/2006/main" xmlns:r="http://schemas.openxmlformats.org/officeDocument/2006/relationships" xmlns:p="http://schemas.openxmlformats.org/presentationml/2006/main">
   <p:cSld>
-    <p:bg>
-      <p:bgPr>
-        <a:solidFill>
-          <a:schemeClr val="tx1"/>
-        </a:solidFill>
-        <a:effectLst/>
-      </p:bgPr>
-    </p:bg>
     <p:spTree>
       <p:nvGrpSpPr>
         <p:cNvPr id="1" name=""/>
@@ -4029,14 +3394,154 @@
       </p:grpSpPr>
       <p:sp>
         <p:nvSpPr>
-          <p:cNvPr id="5" name="Rectangle 4"/>
+          <p:cNvPr id="2" name="Title 1"/>
+          <p:cNvSpPr>
+            <a:spLocks noGrp="1"/>
+          </p:cNvSpPr>
+          <p:nvPr>
+            <p:ph type="title"/>
+          </p:nvPr>
+        </p:nvSpPr>
+        <p:spPr/>
+        <p:txBody>
+          <a:bodyPr/>
+          <a:lstStyle/>
+          <a:p>
+            <a:r>
+              <a:rPr lang="en-US" dirty="0"/>
+              <a:t>Data Structure</a:t>
+            </a:r>
+          </a:p>
+        </p:txBody>
+      </p:sp>
+      <p:sp>
+        <p:nvSpPr>
+          <p:cNvPr id="3" name="Content Placeholder 2"/>
+          <p:cNvSpPr>
+            <a:spLocks noGrp="1"/>
+          </p:cNvSpPr>
+          <p:nvPr>
+            <p:ph idx="1"/>
+          </p:nvPr>
+        </p:nvSpPr>
+        <p:spPr>
+          <a:xfrm>
+            <a:off x="838200" y="1825624"/>
+            <a:ext cx="10515600" cy="4855591"/>
+          </a:xfrm>
+        </p:spPr>
+        <p:txBody>
+          <a:bodyPr>
+            <a:noAutofit/>
+          </a:bodyPr>
+          <a:lstStyle/>
+          <a:p>
+            <a:pPr marL="0" indent="0">
+              <a:buNone/>
+            </a:pPr>
+            <a:r>
+              <a:rPr lang="en-US" sz="2400" dirty="0"/>
+              <a:t>Tag data is stored in UTF-8 text files in same folder as the photo(s) they apply to.</a:t>
+            </a:r>
+          </a:p>
+          <a:p>
+            <a:r>
+              <a:rPr lang="en-US" sz="2400" b="1" dirty="0"/>
+              <a:t>tags.txt </a:t>
+            </a:r>
+            <a:r>
+              <a:rPr lang="en-US" sz="2400" dirty="0"/>
+              <a:t>– applies to </a:t>
+            </a:r>
+            <a:r>
+              <a:rPr lang="en-US" sz="2400" i="1" dirty="0"/>
+              <a:t>all photos </a:t>
+            </a:r>
+            <a:r>
+              <a:rPr lang="en-US" sz="2400" dirty="0"/>
+              <a:t>in this folder</a:t>
+            </a:r>
+          </a:p>
+          <a:p>
+            <a:r>
+              <a:rPr lang="en-US" sz="2400" b="1" i="1" dirty="0"/>
+              <a:t>xxx</a:t>
+            </a:r>
+            <a:r>
+              <a:rPr lang="en-US" sz="2400" b="1" dirty="0"/>
+              <a:t>-tags.txt </a:t>
+            </a:r>
+            <a:r>
+              <a:rPr lang="en-US" sz="2400" dirty="0"/>
+              <a:t>– applies to </a:t>
+            </a:r>
+            <a:r>
+              <a:rPr lang="en-US" sz="2400" i="1" dirty="0"/>
+              <a:t>specific photo</a:t>
+            </a:r>
+            <a:r>
+              <a:rPr lang="en-US" sz="2400" dirty="0"/>
+              <a:t> named xxx.*</a:t>
+            </a:r>
+          </a:p>
+          <a:p>
+            <a:pPr marL="0" indent="0">
+              <a:buNone/>
+            </a:pPr>
+            <a:endParaRPr lang="en-US" sz="2400" dirty="0"/>
+          </a:p>
+          <a:p>
+            <a:pPr marL="0" indent="0">
+              <a:buNone/>
+            </a:pPr>
+            <a:r>
+              <a:rPr lang="en-US" sz="2400" dirty="0"/>
+              <a:t>Both file types use the same format: </a:t>
+            </a:r>
+          </a:p>
+          <a:p>
+            <a:pPr marL="0" indent="0">
+              <a:buNone/>
+            </a:pPr>
+            <a:endParaRPr lang="en-US" sz="2400" dirty="0"/>
+          </a:p>
+          <a:p>
+            <a:pPr marL="0" indent="0">
+              <a:buNone/>
+            </a:pPr>
+            <a:endParaRPr lang="en-US" sz="2400" dirty="0"/>
+          </a:p>
+          <a:p>
+            <a:pPr marL="0" indent="0">
+              <a:buNone/>
+            </a:pPr>
+            <a:endParaRPr lang="en-US" sz="2000"/>
+          </a:p>
+          <a:p>
+            <a:pPr marL="0" indent="0">
+              <a:buNone/>
+            </a:pPr>
+            <a:r>
+              <a:rPr lang="en-US" sz="2000"/>
+              <a:t>Regarding </a:t>
+            </a:r>
+            <a:r>
+              <a:rPr lang="en-US" sz="2000" dirty="0"/>
+              <a:t>optional timestamp : if provided, this is the “one source of truth” for the photo, and overrides any timestamp in the image file’s metadata. Common use: to add the actual photo date/time to scanned images from pre-digital times. Partial timestamp is allowed – for example, “Timestamp: 1990-06” for a photo taken in June 1990.</a:t>
+            </a:r>
+          </a:p>
+        </p:txBody>
+      </p:sp>
+      <p:sp>
+        <p:nvSpPr>
+          <p:cNvPr id="4" name="Rectangle 3"/>
           <p:cNvSpPr/>
           <p:nvPr/>
         </p:nvSpPr>
         <p:spPr>
           <a:xfrm>
-            <a:off x="573024" y="426720"/>
-            <a:ext cx="11021568" cy="5693866"/>
+            <a:off x="5766816" y="3389376"/>
+            <a:ext cx="4023360" cy="1280160"/>
           </a:xfrm>
           <a:prstGeom prst="rect">
             <a:avLst/>
@@ -4044,257 +3549,390 @@
           <a:solidFill>
             <a:schemeClr val="tx1"/>
           </a:solidFill>
+          <a:ln>
+            <a:noFill/>
+          </a:ln>
         </p:spPr>
-        <p:txBody>
-          <a:bodyPr wrap="square">
+        <p:style>
+          <a:lnRef idx="2">
+            <a:schemeClr val="accent1">
+              <a:shade val="50000"/>
+            </a:schemeClr>
+          </a:lnRef>
+          <a:fillRef idx="1">
+            <a:schemeClr val="accent1"/>
+          </a:fillRef>
+          <a:effectRef idx="0">
+            <a:schemeClr val="accent1"/>
+          </a:effectRef>
+          <a:fontRef idx="minor">
+            <a:schemeClr val="lt1"/>
+          </a:fontRef>
+        </p:style>
+        <p:txBody>
+          <a:bodyPr rtlCol="0" anchor="ctr"/>
+          <a:lstStyle/>
+          <a:p>
+            <a:r>
+              <a:rPr lang="en-US" dirty="0">
+                <a:latin typeface="Consolas" panose="020B0609020204030204" pitchFamily="49" charset="0"/>
+              </a:rPr>
+              <a:t>Title: &lt;optional title&gt;</a:t>
+            </a:r>
+          </a:p>
+          <a:p>
+            <a:r>
+              <a:rPr lang="en-US" dirty="0">
+                <a:latin typeface="Consolas" panose="020B0609020204030204" pitchFamily="49" charset="0"/>
+              </a:rPr>
+              <a:t>Timestamp: YYYY-MM-DD HH:MM:SS</a:t>
+            </a:r>
+          </a:p>
+          <a:p>
+            <a:r>
+              <a:rPr lang="en-US" dirty="0">
+                <a:latin typeface="Consolas" panose="020B0609020204030204" pitchFamily="49" charset="0"/>
+              </a:rPr>
+              <a:t>URL: http://flickr_etc</a:t>
+            </a:r>
+          </a:p>
+          <a:p>
+            <a:r>
+              <a:rPr lang="en-US" dirty="0">
+                <a:latin typeface="Consolas" panose="020B0609020204030204" pitchFamily="49" charset="0"/>
+              </a:rPr>
+              <a:t>Tags: </a:t>
+            </a:r>
+            <a:r>
+              <a:rPr lang="en-US" dirty="0" err="1">
+                <a:latin typeface="Consolas" panose="020B0609020204030204" pitchFamily="49" charset="0"/>
+              </a:rPr>
+              <a:t>xxx,yyy,zzz</a:t>
+            </a:r>
+            <a:endParaRPr lang="en-US" dirty="0">
+              <a:latin typeface="Consolas" panose="020B0609020204030204" pitchFamily="49" charset="0"/>
+            </a:endParaRPr>
+          </a:p>
+        </p:txBody>
+      </p:sp>
+      <p:cxnSp>
+        <p:nvCxnSpPr>
+          <p:cNvPr id="8" name="Straight Arrow Connector 7"/>
+          <p:cNvCxnSpPr/>
+          <p:nvPr/>
+        </p:nvCxnSpPr>
+        <p:spPr>
+          <a:xfrm flipH="1">
+            <a:off x="8811768" y="3254440"/>
+            <a:ext cx="1796796" cy="366584"/>
+          </a:xfrm>
+          <a:prstGeom prst="straightConnector1">
+            <a:avLst/>
+          </a:prstGeom>
+          <a:ln w="57150">
+            <a:solidFill>
+              <a:srgbClr val="FF0000"/>
+            </a:solidFill>
+            <a:tailEnd type="triangle"/>
+          </a:ln>
+        </p:spPr>
+        <p:style>
+          <a:lnRef idx="1">
+            <a:schemeClr val="accent1"/>
+          </a:lnRef>
+          <a:fillRef idx="0">
+            <a:schemeClr val="accent1"/>
+          </a:fillRef>
+          <a:effectRef idx="0">
+            <a:schemeClr val="accent1"/>
+          </a:effectRef>
+          <a:fontRef idx="minor">
+            <a:schemeClr val="tx1"/>
+          </a:fontRef>
+        </p:style>
+      </p:cxnSp>
+      <p:cxnSp>
+        <p:nvCxnSpPr>
+          <p:cNvPr id="9" name="Straight Arrow Connector 8"/>
+          <p:cNvCxnSpPr/>
+          <p:nvPr/>
+        </p:nvCxnSpPr>
+        <p:spPr>
+          <a:xfrm flipH="1">
+            <a:off x="9706356" y="3278824"/>
+            <a:ext cx="902208" cy="598232"/>
+          </a:xfrm>
+          <a:prstGeom prst="straightConnector1">
+            <a:avLst/>
+          </a:prstGeom>
+          <a:ln w="57150">
+            <a:solidFill>
+              <a:srgbClr val="FF0000"/>
+            </a:solidFill>
+            <a:tailEnd type="triangle"/>
+          </a:ln>
+        </p:spPr>
+        <p:style>
+          <a:lnRef idx="1">
+            <a:schemeClr val="accent1"/>
+          </a:lnRef>
+          <a:fillRef idx="0">
+            <a:schemeClr val="accent1"/>
+          </a:fillRef>
+          <a:effectRef idx="0">
+            <a:schemeClr val="accent1"/>
+          </a:effectRef>
+          <a:fontRef idx="minor">
+            <a:schemeClr val="tx1"/>
+          </a:fontRef>
+        </p:style>
+      </p:cxnSp>
+      <p:sp>
+        <p:nvSpPr>
+          <p:cNvPr id="13" name="TextBox 12"/>
+          <p:cNvSpPr txBox="1"/>
+          <p:nvPr/>
+        </p:nvSpPr>
+        <p:spPr>
+          <a:xfrm>
+            <a:off x="10593146" y="3034609"/>
+            <a:ext cx="1066318" cy="707886"/>
+          </a:xfrm>
+          <a:prstGeom prst="rect">
+            <a:avLst/>
+          </a:prstGeom>
+          <a:noFill/>
+        </p:spPr>
+        <p:txBody>
+          <a:bodyPr wrap="none" rtlCol="0">
             <a:spAutoFit/>
           </a:bodyPr>
           <a:lstStyle/>
           <a:p>
             <a:r>
-              <a:rPr lang="en-US" sz="2800" dirty="0">
-                <a:solidFill>
-                  <a:schemeClr val="bg1"/>
-                </a:solidFill>
-                <a:latin typeface="Consolas" panose="020B0609020204030204" pitchFamily="49" charset="0"/>
-              </a:rPr>
-              <a:t>C:\&gt;phototag </a:t>
-            </a:r>
-            <a:r>
-              <a:rPr lang="en-US" sz="2800" b="1" dirty="0">
-                <a:solidFill>
-                  <a:schemeClr val="accent1">
-                    <a:lumMod val="60000"/>
-                    <a:lumOff val="40000"/>
-                  </a:schemeClr>
-                </a:solidFill>
-                <a:latin typeface="Consolas" panose="020B0609020204030204" pitchFamily="49" charset="0"/>
-              </a:rPr>
-              <a:t>add</a:t>
-            </a:r>
-            <a:r>
-              <a:rPr lang="en-US" sz="2800" b="1" dirty="0">
-                <a:solidFill>
-                  <a:schemeClr val="bg1"/>
-                </a:solidFill>
-                <a:latin typeface="Consolas" panose="020B0609020204030204" pitchFamily="49" charset="0"/>
-              </a:rPr>
-              <a:t> </a:t>
-            </a:r>
-            <a:r>
-              <a:rPr lang="en-US" sz="2800" dirty="0">
-                <a:solidFill>
-                  <a:schemeClr val="bg1"/>
-                </a:solidFill>
-                <a:latin typeface="Consolas" panose="020B0609020204030204" pitchFamily="49" charset="0"/>
-              </a:rPr>
-              <a:t>–h</a:t>
-            </a:r>
-          </a:p>
-          <a:p>
-            <a:endParaRPr lang="en-US" sz="2800" dirty="0">
-              <a:solidFill>
-                <a:schemeClr val="bg1"/>
-              </a:solidFill>
-              <a:latin typeface="Consolas" panose="020B0609020204030204" pitchFamily="49" charset="0"/>
-            </a:endParaRPr>
-          </a:p>
-          <a:p>
-            <a:r>
-              <a:rPr lang="en-US" sz="2800" dirty="0">
-                <a:solidFill>
-                  <a:schemeClr val="bg1"/>
-                </a:solidFill>
-                <a:latin typeface="Consolas" panose="020B0609020204030204" pitchFamily="49" charset="0"/>
-              </a:rPr>
-              <a:t>Usage: phototag add [OPTIONS]</a:t>
-            </a:r>
-          </a:p>
-          <a:p>
-            <a:endParaRPr lang="en-US" sz="2800" dirty="0">
-              <a:solidFill>
-                <a:schemeClr val="bg1"/>
-              </a:solidFill>
-              <a:latin typeface="Consolas" panose="020B0609020204030204" pitchFamily="49" charset="0"/>
-            </a:endParaRPr>
-          </a:p>
-          <a:p>
-            <a:r>
-              <a:rPr lang="en-US" sz="2800" dirty="0">
-                <a:solidFill>
-                  <a:schemeClr val="bg1"/>
-                </a:solidFill>
-                <a:latin typeface="Consolas" panose="020B0609020204030204" pitchFamily="49" charset="0"/>
-              </a:rPr>
-              <a:t>  Add tags to a folder or photo</a:t>
-            </a:r>
-          </a:p>
-          <a:p>
-            <a:endParaRPr lang="en-US" sz="2800" dirty="0">
-              <a:solidFill>
-                <a:schemeClr val="bg1"/>
-              </a:solidFill>
-              <a:latin typeface="Consolas" panose="020B0609020204030204" pitchFamily="49" charset="0"/>
-            </a:endParaRPr>
-          </a:p>
-          <a:p>
-            <a:r>
-              <a:rPr lang="en-US" sz="2800" dirty="0">
-                <a:solidFill>
-                  <a:schemeClr val="bg1"/>
-                </a:solidFill>
-                <a:latin typeface="Consolas" panose="020B0609020204030204" pitchFamily="49" charset="0"/>
-              </a:rPr>
-              <a:t>Options:</a:t>
-            </a:r>
-          </a:p>
-          <a:p>
-            <a:r>
-              <a:rPr lang="en-US" sz="2800" dirty="0">
-                <a:solidFill>
-                  <a:schemeClr val="bg1"/>
-                </a:solidFill>
-                <a:latin typeface="Consolas" panose="020B0609020204030204" pitchFamily="49" charset="0"/>
-              </a:rPr>
-              <a:t>  -t, --tags &lt;</a:t>
-            </a:r>
-            <a:r>
-              <a:rPr lang="en-US" sz="2800" dirty="0" err="1">
-                <a:solidFill>
-                  <a:schemeClr val="bg1"/>
-                </a:solidFill>
-                <a:latin typeface="Consolas" panose="020B0609020204030204" pitchFamily="49" charset="0"/>
-              </a:rPr>
-              <a:t>str</a:t>
-            </a:r>
-            <a:r>
-              <a:rPr lang="en-US" sz="2800" dirty="0">
-                <a:solidFill>
-                  <a:schemeClr val="bg1"/>
-                </a:solidFill>
-                <a:latin typeface="Consolas" panose="020B0609020204030204" pitchFamily="49" charset="0"/>
-              </a:rPr>
-              <a:t>&gt;      tags (tag1/tag2/</a:t>
-            </a:r>
-            <a:r>
-              <a:rPr lang="en-US" sz="2800" dirty="0" err="1">
-                <a:solidFill>
-                  <a:schemeClr val="bg1"/>
-                </a:solidFill>
-                <a:latin typeface="Consolas" panose="020B0609020204030204" pitchFamily="49" charset="0"/>
-              </a:rPr>
-              <a:t>etc</a:t>
-            </a:r>
-            <a:r>
-              <a:rPr lang="en-US" sz="2800" dirty="0">
-                <a:solidFill>
-                  <a:schemeClr val="bg1"/>
-                </a:solidFill>
-                <a:latin typeface="Consolas" panose="020B0609020204030204" pitchFamily="49" charset="0"/>
-              </a:rPr>
-              <a:t>)</a:t>
-            </a:r>
-          </a:p>
-          <a:p>
-            <a:r>
-              <a:rPr lang="en-US" sz="2800" dirty="0">
-                <a:solidFill>
-                  <a:schemeClr val="bg1"/>
-                </a:solidFill>
-                <a:latin typeface="Consolas" panose="020B0609020204030204" pitchFamily="49" charset="0"/>
-              </a:rPr>
-              <a:t>  -f, --folder &lt;</a:t>
-            </a:r>
-            <a:r>
-              <a:rPr lang="en-US" sz="2800" dirty="0" err="1">
-                <a:solidFill>
-                  <a:schemeClr val="bg1"/>
-                </a:solidFill>
-                <a:latin typeface="Consolas" panose="020B0609020204030204" pitchFamily="49" charset="0"/>
-              </a:rPr>
-              <a:t>str</a:t>
-            </a:r>
-            <a:r>
-              <a:rPr lang="en-US" sz="2800" dirty="0">
-                <a:solidFill>
-                  <a:schemeClr val="bg1"/>
-                </a:solidFill>
-                <a:latin typeface="Consolas" panose="020B0609020204030204" pitchFamily="49" charset="0"/>
-              </a:rPr>
-              <a:t>&gt;    folder</a:t>
-            </a:r>
-          </a:p>
-          <a:p>
-            <a:r>
-              <a:rPr lang="en-US" sz="2800" dirty="0">
-                <a:solidFill>
-                  <a:schemeClr val="bg1"/>
-                </a:solidFill>
-                <a:latin typeface="Consolas" panose="020B0609020204030204" pitchFamily="49" charset="0"/>
-              </a:rPr>
-              <a:t>  -p, --photo &lt;</a:t>
-            </a:r>
-            <a:r>
-              <a:rPr lang="en-US" sz="2800" dirty="0" err="1">
-                <a:solidFill>
-                  <a:schemeClr val="bg1"/>
-                </a:solidFill>
-                <a:latin typeface="Consolas" panose="020B0609020204030204" pitchFamily="49" charset="0"/>
-              </a:rPr>
-              <a:t>str</a:t>
-            </a:r>
-            <a:r>
-              <a:rPr lang="en-US" sz="2800" dirty="0">
-                <a:solidFill>
-                  <a:schemeClr val="bg1"/>
-                </a:solidFill>
-                <a:latin typeface="Consolas" panose="020B0609020204030204" pitchFamily="49" charset="0"/>
-              </a:rPr>
-              <a:t>&gt;     photo (filename)</a:t>
-            </a:r>
-          </a:p>
-          <a:p>
-            <a:r>
-              <a:rPr lang="en-US" sz="2800" dirty="0">
-                <a:solidFill>
-                  <a:schemeClr val="bg1"/>
-                </a:solidFill>
-                <a:latin typeface="Consolas" panose="020B0609020204030204" pitchFamily="49" charset="0"/>
-              </a:rPr>
-              <a:t>  -h, --help            Show this message and exit.</a:t>
-            </a:r>
-          </a:p>
-          <a:p>
-            <a:endParaRPr lang="en-US" sz="2800" dirty="0">
-              <a:solidFill>
-                <a:schemeClr val="bg1"/>
-              </a:solidFill>
-              <a:latin typeface="Consolas" panose="020B0609020204030204" pitchFamily="49" charset="0"/>
-            </a:endParaRPr>
-          </a:p>
-          <a:p>
-            <a:r>
-              <a:rPr lang="en-US" sz="2800" dirty="0">
-                <a:solidFill>
-                  <a:schemeClr val="bg1"/>
-                </a:solidFill>
-                <a:latin typeface="Consolas" panose="020B0609020204030204" pitchFamily="49" charset="0"/>
-              </a:rPr>
-              <a:t>C:\&gt;</a:t>
-            </a:r>
-            <a:endParaRPr lang="en-US" sz="2800" dirty="0">
-              <a:solidFill>
-                <a:schemeClr val="bg1"/>
-              </a:solidFill>
-              <a:latin typeface="Consolas" panose="020B0609020204030204" pitchFamily="49" charset="0"/>
-            </a:endParaRPr>
-          </a:p>
-        </p:txBody>
-      </p:sp>
+              <a:rPr lang="en-US" sz="2000" b="1" dirty="0">
+                <a:solidFill>
+                  <a:srgbClr val="FF0000"/>
+                </a:solidFill>
+              </a:rPr>
+              <a:t>0 or 1 of</a:t>
+            </a:r>
+            <a:br>
+              <a:rPr lang="en-US" sz="2000" b="1" dirty="0">
+                <a:solidFill>
+                  <a:srgbClr val="FF0000"/>
+                </a:solidFill>
+              </a:rPr>
+            </a:br>
+            <a:r>
+              <a:rPr lang="en-US" sz="2000" b="1" dirty="0">
+                <a:solidFill>
+                  <a:srgbClr val="FF0000"/>
+                </a:solidFill>
+              </a:rPr>
+              <a:t>these</a:t>
+            </a:r>
+          </a:p>
+        </p:txBody>
+      </p:sp>
+      <p:sp>
+        <p:nvSpPr>
+          <p:cNvPr id="14" name="TextBox 13"/>
+          <p:cNvSpPr txBox="1"/>
+          <p:nvPr/>
+        </p:nvSpPr>
+        <p:spPr>
+          <a:xfrm>
+            <a:off x="10593146" y="4404010"/>
+            <a:ext cx="1603324" cy="707886"/>
+          </a:xfrm>
+          <a:prstGeom prst="rect">
+            <a:avLst/>
+          </a:prstGeom>
+          <a:noFill/>
+        </p:spPr>
+        <p:txBody>
+          <a:bodyPr wrap="none" rtlCol="0">
+            <a:spAutoFit/>
+          </a:bodyPr>
+          <a:lstStyle/>
+          <a:p>
+            <a:r>
+              <a:rPr lang="en-US" sz="2000" b="1" dirty="0">
+                <a:solidFill>
+                  <a:srgbClr val="FF0000"/>
+                </a:solidFill>
+              </a:rPr>
+              <a:t>Any number</a:t>
+            </a:r>
+            <a:br>
+              <a:rPr lang="en-US" sz="2000" b="1" dirty="0">
+                <a:solidFill>
+                  <a:srgbClr val="FF0000"/>
+                </a:solidFill>
+              </a:rPr>
+            </a:br>
+            <a:r>
+              <a:rPr lang="en-US" sz="2000" b="1" dirty="0">
+                <a:solidFill>
+                  <a:srgbClr val="FF0000"/>
+                </a:solidFill>
+              </a:rPr>
+              <a:t>of these lines</a:t>
+            </a:r>
+          </a:p>
+        </p:txBody>
+      </p:sp>
+      <p:cxnSp>
+        <p:nvCxnSpPr>
+          <p:cNvPr id="15" name="Straight Arrow Connector 14"/>
+          <p:cNvCxnSpPr/>
+          <p:nvPr/>
+        </p:nvCxnSpPr>
+        <p:spPr>
+          <a:xfrm flipH="1" flipV="1">
+            <a:off x="8680704" y="4145280"/>
+            <a:ext cx="1891284" cy="486819"/>
+          </a:xfrm>
+          <a:prstGeom prst="straightConnector1">
+            <a:avLst/>
+          </a:prstGeom>
+          <a:ln w="57150">
+            <a:solidFill>
+              <a:srgbClr val="FF0000"/>
+            </a:solidFill>
+            <a:tailEnd type="triangle"/>
+          </a:ln>
+        </p:spPr>
+        <p:style>
+          <a:lnRef idx="1">
+            <a:schemeClr val="accent1"/>
+          </a:lnRef>
+          <a:fillRef idx="0">
+            <a:schemeClr val="accent1"/>
+          </a:fillRef>
+          <a:effectRef idx="0">
+            <a:schemeClr val="accent1"/>
+          </a:effectRef>
+          <a:fontRef idx="minor">
+            <a:schemeClr val="tx1"/>
+          </a:fontRef>
+        </p:style>
+      </p:cxnSp>
+      <p:cxnSp>
+        <p:nvCxnSpPr>
+          <p:cNvPr id="17" name="Straight Arrow Connector 16"/>
+          <p:cNvCxnSpPr/>
+          <p:nvPr/>
+        </p:nvCxnSpPr>
+        <p:spPr>
+          <a:xfrm flipH="1" flipV="1">
+            <a:off x="8071104" y="4444846"/>
+            <a:ext cx="2500884" cy="187253"/>
+          </a:xfrm>
+          <a:prstGeom prst="straightConnector1">
+            <a:avLst/>
+          </a:prstGeom>
+          <a:ln w="57150">
+            <a:solidFill>
+              <a:srgbClr val="FF0000"/>
+            </a:solidFill>
+            <a:tailEnd type="triangle"/>
+          </a:ln>
+        </p:spPr>
+        <p:style>
+          <a:lnRef idx="1">
+            <a:schemeClr val="accent1"/>
+          </a:lnRef>
+          <a:fillRef idx="0">
+            <a:schemeClr val="accent1"/>
+          </a:fillRef>
+          <a:effectRef idx="0">
+            <a:schemeClr val="accent1"/>
+          </a:effectRef>
+          <a:fontRef idx="minor">
+            <a:schemeClr val="tx1"/>
+          </a:fontRef>
+        </p:style>
+      </p:cxnSp>
     </p:spTree>
     <p:extLst>
       <p:ext uri="{BB962C8B-B14F-4D97-AF65-F5344CB8AC3E}">
-        <p14:creationId xmlns:p14="http://schemas.microsoft.com/office/powerpoint/2010/main" val="3712991545"/>
+        <p14:creationId xmlns:p14="http://schemas.microsoft.com/office/powerpoint/2010/main" val="938076911"/>
+      </p:ext>
+    </p:extLst>
+  </p:cSld>
+  <p:clrMapOvr>
+    <a:masterClrMapping/>
+  </p:clrMapOvr>
+</p:sld>
+</file>
+
+<file path=ppt/slides/slide4.xml><?xml version="1.0" encoding="utf-8"?>
+<p:sld xmlns:a="http://schemas.openxmlformats.org/drawingml/2006/main" xmlns:r="http://schemas.openxmlformats.org/officeDocument/2006/relationships" xmlns:p="http://schemas.openxmlformats.org/presentationml/2006/main">
+  <p:cSld>
+    <p:spTree>
+      <p:nvGrpSpPr>
+        <p:cNvPr id="1" name=""/>
+        <p:cNvGrpSpPr/>
+        <p:nvPr/>
+      </p:nvGrpSpPr>
+      <p:grpSpPr>
+        <a:xfrm>
+          <a:off x="0" y="0"/>
+          <a:ext cx="0" cy="0"/>
+          <a:chOff x="0" y="0"/>
+          <a:chExt cx="0" cy="0"/>
+        </a:xfrm>
+      </p:grpSpPr>
+      <p:sp>
+        <p:nvSpPr>
+          <p:cNvPr id="2" name="Title 1"/>
+          <p:cNvSpPr>
+            <a:spLocks noGrp="1"/>
+          </p:cNvSpPr>
+          <p:nvPr>
+            <p:ph type="title"/>
+          </p:nvPr>
+        </p:nvSpPr>
+        <p:spPr/>
+        <p:txBody>
+          <a:bodyPr/>
+          <a:lstStyle/>
+          <a:p>
+            <a:r>
+              <a:rPr lang="en-US" dirty="0"/>
+              <a:t>Command-line tool</a:t>
+            </a:r>
+          </a:p>
+        </p:txBody>
+      </p:sp>
+      <p:sp>
+        <p:nvSpPr>
+          <p:cNvPr id="3" name="Text Placeholder 2"/>
+          <p:cNvSpPr>
+            <a:spLocks noGrp="1"/>
+          </p:cNvSpPr>
+          <p:nvPr>
+            <p:ph type="body" idx="1"/>
+          </p:nvPr>
+        </p:nvSpPr>
+        <p:spPr/>
+        <p:txBody>
+          <a:bodyPr/>
+          <a:lstStyle/>
+          <a:p>
+            <a:r>
+              <a:rPr lang="en-US" dirty="0"/>
+              <a:t>Click-based tool for managing tags</a:t>
+            </a:r>
+          </a:p>
+        </p:txBody>
+      </p:sp>
+    </p:spTree>
+    <p:extLst>
+      <p:ext uri="{BB962C8B-B14F-4D97-AF65-F5344CB8AC3E}">
+        <p14:creationId xmlns:p14="http://schemas.microsoft.com/office/powerpoint/2010/main" val="4220710247"/>
       </p:ext>
     </p:extLst>
   </p:cSld>
@@ -4338,7 +3976,7 @@
         <p:spPr>
           <a:xfrm>
             <a:off x="573024" y="426720"/>
-            <a:ext cx="11021568" cy="5693866"/>
+            <a:ext cx="11021568" cy="6124754"/>
           </a:xfrm>
           <a:prstGeom prst="rect">
             <a:avLst/>
@@ -4360,7 +3998,7 @@
                 </a:solidFill>
                 <a:latin typeface="Consolas" panose="020B0609020204030204" pitchFamily="49" charset="0"/>
               </a:rPr>
-              <a:t>C:\&gt;phototag </a:t>
+              <a:t>C:\&gt;</a:t>
             </a:r>
             <a:r>
               <a:rPr lang="en-US" sz="2800" b="1" dirty="0">
@@ -4372,28 +4010,8 @@
                 </a:solidFill>
                 <a:latin typeface="Consolas" panose="020B0609020204030204" pitchFamily="49" charset="0"/>
               </a:rPr>
-              <a:t>remove</a:t>
-            </a:r>
-            <a:r>
-              <a:rPr lang="en-US" sz="2800" b="1" dirty="0">
-                <a:solidFill>
-                  <a:schemeClr val="bg1"/>
-                </a:solidFill>
-                <a:latin typeface="Consolas" panose="020B0609020204030204" pitchFamily="49" charset="0"/>
-              </a:rPr>
-              <a:t> </a:t>
-            </a:r>
-            <a:r>
-              <a:rPr lang="en-US" sz="2800" dirty="0">
-                <a:solidFill>
-                  <a:schemeClr val="bg1"/>
-                </a:solidFill>
-                <a:latin typeface="Consolas" panose="020B0609020204030204" pitchFamily="49" charset="0"/>
-              </a:rPr>
-              <a:t>–h</a:t>
-            </a:r>
-          </a:p>
-          <a:p>
+              <a:t>phototag -h</a:t>
+            </a:r>
             <a:endParaRPr lang="en-US" sz="2800" dirty="0">
               <a:solidFill>
                 <a:schemeClr val="bg1"/>
@@ -4409,7 +4027,7 @@
                 </a:solidFill>
                 <a:latin typeface="Consolas" panose="020B0609020204030204" pitchFamily="49" charset="0"/>
               </a:rPr>
-              <a:t>Usage: phototag remove [OPTIONS]</a:t>
+              <a:t>Usage: phototag [options] COMMAND [ARGS] ...</a:t>
             </a:r>
           </a:p>
           <a:p>
@@ -4428,7 +4046,19 @@
                 </a:solidFill>
                 <a:latin typeface="Consolas" panose="020B0609020204030204" pitchFamily="49" charset="0"/>
               </a:rPr>
-              <a:t>  Remove tags from a folder or photo</a:t>
+              <a:t>  </a:t>
+            </a:r>
+            <a:r>
+              <a:rPr lang="en-US" sz="2800" b="1" dirty="0">
+                <a:solidFill>
+                  <a:schemeClr val="accent1">
+                    <a:lumMod val="60000"/>
+                    <a:lumOff val="40000"/>
+                  </a:schemeClr>
+                </a:solidFill>
+                <a:latin typeface="Consolas" panose="020B0609020204030204" pitchFamily="49" charset="0"/>
+              </a:rPr>
+              <a:t>Manage photo tags</a:t>
             </a:r>
           </a:p>
           <a:p>
@@ -4458,112 +4088,7 @@
                 </a:solidFill>
                 <a:latin typeface="Consolas" panose="020B0609020204030204" pitchFamily="49" charset="0"/>
               </a:rPr>
-              <a:t>  -t, --tags &lt;</a:t>
-            </a:r>
-            <a:r>
-              <a:rPr lang="en-US" sz="2800" dirty="0" err="1">
-                <a:solidFill>
-                  <a:schemeClr val="bg1"/>
-                </a:solidFill>
-                <a:latin typeface="Consolas" panose="020B0609020204030204" pitchFamily="49" charset="0"/>
-              </a:rPr>
-              <a:t>str</a:t>
-            </a:r>
-            <a:r>
-              <a:rPr lang="en-US" sz="2800" dirty="0">
-                <a:solidFill>
-                  <a:schemeClr val="bg1"/>
-                </a:solidFill>
-                <a:latin typeface="Consolas" panose="020B0609020204030204" pitchFamily="49" charset="0"/>
-              </a:rPr>
-              <a:t>&gt;      tags (tag1/tag2/</a:t>
-            </a:r>
-            <a:r>
-              <a:rPr lang="en-US" sz="2800" dirty="0" err="1">
-                <a:solidFill>
-                  <a:schemeClr val="bg1"/>
-                </a:solidFill>
-                <a:latin typeface="Consolas" panose="020B0609020204030204" pitchFamily="49" charset="0"/>
-              </a:rPr>
-              <a:t>etc</a:t>
-            </a:r>
-            <a:r>
-              <a:rPr lang="en-US" sz="2800" dirty="0">
-                <a:solidFill>
-                  <a:schemeClr val="bg1"/>
-                </a:solidFill>
-                <a:latin typeface="Consolas" panose="020B0609020204030204" pitchFamily="49" charset="0"/>
-              </a:rPr>
-              <a:t>)</a:t>
-            </a:r>
-          </a:p>
-          <a:p>
-            <a:r>
-              <a:rPr lang="en-US" sz="2800" dirty="0">
-                <a:solidFill>
-                  <a:schemeClr val="bg1"/>
-                </a:solidFill>
-                <a:latin typeface="Consolas" panose="020B0609020204030204" pitchFamily="49" charset="0"/>
-              </a:rPr>
-              <a:t>  -f, --folder &lt;</a:t>
-            </a:r>
-            <a:r>
-              <a:rPr lang="en-US" sz="2800" dirty="0" err="1">
-                <a:solidFill>
-                  <a:schemeClr val="bg1"/>
-                </a:solidFill>
-                <a:latin typeface="Consolas" panose="020B0609020204030204" pitchFamily="49" charset="0"/>
-              </a:rPr>
-              <a:t>str</a:t>
-            </a:r>
-            <a:r>
-              <a:rPr lang="en-US" sz="2800" dirty="0">
-                <a:solidFill>
-                  <a:schemeClr val="bg1"/>
-                </a:solidFill>
-                <a:latin typeface="Consolas" panose="020B0609020204030204" pitchFamily="49" charset="0"/>
-              </a:rPr>
-              <a:t>&gt;    folder</a:t>
-            </a:r>
-          </a:p>
-          <a:p>
-            <a:r>
-              <a:rPr lang="en-US" sz="2800" dirty="0">
-                <a:solidFill>
-                  <a:schemeClr val="bg1"/>
-                </a:solidFill>
-                <a:latin typeface="Consolas" panose="020B0609020204030204" pitchFamily="49" charset="0"/>
-              </a:rPr>
-              <a:t>  -p, --photo &lt;</a:t>
-            </a:r>
-            <a:r>
-              <a:rPr lang="en-US" sz="2800" dirty="0" err="1">
-                <a:solidFill>
-                  <a:schemeClr val="bg1"/>
-                </a:solidFill>
-                <a:latin typeface="Consolas" panose="020B0609020204030204" pitchFamily="49" charset="0"/>
-              </a:rPr>
-              <a:t>str</a:t>
-            </a:r>
-            <a:r>
-              <a:rPr lang="en-US" sz="2800" dirty="0">
-                <a:solidFill>
-                  <a:schemeClr val="bg1"/>
-                </a:solidFill>
-                <a:latin typeface="Consolas" panose="020B0609020204030204" pitchFamily="49" charset="0"/>
-              </a:rPr>
-              <a:t>&gt;     photo (filename)</a:t>
-            </a:r>
-          </a:p>
-          <a:p>
-            <a:r>
-              <a:rPr lang="en-US" sz="2800" dirty="0">
-                <a:solidFill>
-                  <a:schemeClr val="bg1"/>
-                </a:solidFill>
-                <a:latin typeface="Consolas" panose="020B0609020204030204" pitchFamily="49" charset="0"/>
-              </a:rPr>
-              <a:t>  -h, --help            Show this message and exit.</a:t>
+              <a:t>-h, --help            Show this message and exit.</a:t>
             </a:r>
           </a:p>
           <a:p>
@@ -4582,21 +4107,142 @@
                 </a:solidFill>
                 <a:latin typeface="Consolas" panose="020B0609020204030204" pitchFamily="49" charset="0"/>
               </a:rPr>
-              <a:t>C:\&gt;</a:t>
-            </a:r>
-            <a:endParaRPr lang="en-US" sz="2800" dirty="0">
-              <a:solidFill>
-                <a:schemeClr val="bg1"/>
-              </a:solidFill>
-              <a:latin typeface="Consolas" panose="020B0609020204030204" pitchFamily="49" charset="0"/>
-            </a:endParaRPr>
+              <a:t>Commands:</a:t>
+            </a:r>
+          </a:p>
+          <a:p>
+            <a:r>
+              <a:rPr lang="en-US" sz="2800" dirty="0">
+                <a:solidFill>
+                  <a:schemeClr val="bg1"/>
+                </a:solidFill>
+                <a:latin typeface="Consolas" panose="020B0609020204030204" pitchFamily="49" charset="0"/>
+              </a:rPr>
+              <a:t>  config  Manage settings</a:t>
+            </a:r>
+          </a:p>
+          <a:p>
+            <a:r>
+              <a:rPr lang="en-US" sz="2800" dirty="0">
+                <a:solidFill>
+                  <a:schemeClr val="bg1"/>
+                </a:solidFill>
+                <a:latin typeface="Consolas" panose="020B0609020204030204" pitchFamily="49" charset="0"/>
+              </a:rPr>
+              <a:t>  view    </a:t>
+            </a:r>
+            <a:r>
+              <a:rPr lang="en-US" sz="2800" dirty="0" err="1">
+                <a:solidFill>
+                  <a:schemeClr val="bg1"/>
+                </a:solidFill>
+                <a:latin typeface="Consolas" panose="020B0609020204030204" pitchFamily="49" charset="0"/>
+              </a:rPr>
+              <a:t>View</a:t>
+            </a:r>
+            <a:r>
+              <a:rPr lang="en-US" sz="2800" dirty="0">
+                <a:solidFill>
+                  <a:schemeClr val="bg1"/>
+                </a:solidFill>
+                <a:latin typeface="Consolas" panose="020B0609020204030204" pitchFamily="49" charset="0"/>
+              </a:rPr>
+              <a:t> tags for a folder or photo</a:t>
+            </a:r>
+          </a:p>
+          <a:p>
+            <a:r>
+              <a:rPr lang="en-US" sz="2800" dirty="0">
+                <a:solidFill>
+                  <a:schemeClr val="bg1"/>
+                </a:solidFill>
+                <a:latin typeface="Consolas" panose="020B0609020204030204" pitchFamily="49" charset="0"/>
+              </a:rPr>
+              <a:t>  add     </a:t>
+            </a:r>
+            <a:r>
+              <a:rPr lang="en-US" sz="2800" dirty="0" err="1">
+                <a:solidFill>
+                  <a:schemeClr val="bg1"/>
+                </a:solidFill>
+                <a:latin typeface="Consolas" panose="020B0609020204030204" pitchFamily="49" charset="0"/>
+              </a:rPr>
+              <a:t>Add</a:t>
+            </a:r>
+            <a:r>
+              <a:rPr lang="en-US" sz="2800" dirty="0">
+                <a:solidFill>
+                  <a:schemeClr val="bg1"/>
+                </a:solidFill>
+                <a:latin typeface="Consolas" panose="020B0609020204030204" pitchFamily="49" charset="0"/>
+              </a:rPr>
+              <a:t> tags to a folder or photo</a:t>
+            </a:r>
+          </a:p>
+          <a:p>
+            <a:r>
+              <a:rPr lang="en-US" sz="2800" dirty="0">
+                <a:solidFill>
+                  <a:schemeClr val="bg1"/>
+                </a:solidFill>
+                <a:latin typeface="Consolas" panose="020B0609020204030204" pitchFamily="49" charset="0"/>
+              </a:rPr>
+              <a:t>  remove  </a:t>
+            </a:r>
+            <a:r>
+              <a:rPr lang="en-US" sz="2800" dirty="0" err="1">
+                <a:solidFill>
+                  <a:schemeClr val="bg1"/>
+                </a:solidFill>
+                <a:latin typeface="Consolas" panose="020B0609020204030204" pitchFamily="49" charset="0"/>
+              </a:rPr>
+              <a:t>Remove</a:t>
+            </a:r>
+            <a:r>
+              <a:rPr lang="en-US" sz="2800" dirty="0">
+                <a:solidFill>
+                  <a:schemeClr val="bg1"/>
+                </a:solidFill>
+                <a:latin typeface="Consolas" panose="020B0609020204030204" pitchFamily="49" charset="0"/>
+              </a:rPr>
+              <a:t> tags from a folder or photo</a:t>
+            </a:r>
+          </a:p>
+          <a:p>
+            <a:r>
+              <a:rPr lang="en-US" sz="2800" dirty="0">
+                <a:solidFill>
+                  <a:schemeClr val="bg1"/>
+                </a:solidFill>
+                <a:latin typeface="Consolas" panose="020B0609020204030204" pitchFamily="49" charset="0"/>
+              </a:rPr>
+              <a:t>  search  </a:t>
+            </a:r>
+            <a:r>
+              <a:rPr lang="en-US" sz="2800" dirty="0" err="1">
+                <a:solidFill>
+                  <a:schemeClr val="bg1"/>
+                </a:solidFill>
+                <a:latin typeface="Consolas" panose="020B0609020204030204" pitchFamily="49" charset="0"/>
+              </a:rPr>
+              <a:t>Search</a:t>
+            </a:r>
+            <a:r>
+              <a:rPr lang="en-US" sz="2800" dirty="0">
+                <a:solidFill>
+                  <a:schemeClr val="bg1"/>
+                </a:solidFill>
+                <a:latin typeface="Consolas" panose="020B0609020204030204" pitchFamily="49" charset="0"/>
+              </a:rPr>
+              <a:t> tags</a:t>
+            </a:r>
           </a:p>
         </p:txBody>
       </p:sp>
     </p:spTree>
     <p:extLst>
       <p:ext uri="{BB962C8B-B14F-4D97-AF65-F5344CB8AC3E}">
-        <p14:creationId xmlns:p14="http://schemas.microsoft.com/office/powerpoint/2010/main" val="1296650198"/>
+        <p14:creationId xmlns:p14="http://schemas.microsoft.com/office/powerpoint/2010/main" val="742271513"/>
       </p:ext>
     </p:extLst>
   </p:cSld>
@@ -4640,7 +4286,7 @@
         <p:spPr>
           <a:xfrm>
             <a:off x="573024" y="426720"/>
-            <a:ext cx="11021568" cy="5693866"/>
+            <a:ext cx="11021568" cy="4832092"/>
           </a:xfrm>
           <a:prstGeom prst="rect">
             <a:avLst/>
@@ -4662,7 +4308,7 @@
                 </a:solidFill>
                 <a:latin typeface="Consolas" panose="020B0609020204030204" pitchFamily="49" charset="0"/>
               </a:rPr>
-              <a:t>C:\&gt;phototag </a:t>
+              <a:t>C:\&gt;</a:t>
             </a:r>
             <a:r>
               <a:rPr lang="en-US" sz="2800" b="1" dirty="0">
@@ -4674,7 +4320,7 @@
                 </a:solidFill>
                 <a:latin typeface="Consolas" panose="020B0609020204030204" pitchFamily="49" charset="0"/>
               </a:rPr>
-              <a:t>search</a:t>
+              <a:t>phototag config</a:t>
             </a:r>
             <a:r>
               <a:rPr lang="en-US" sz="2800" b="1" dirty="0">
@@ -4693,6 +4339,17 @@
                 <a:latin typeface="Consolas" panose="020B0609020204030204" pitchFamily="49" charset="0"/>
               </a:rPr>
               <a:t>–h</a:t>
+            </a:r>
+          </a:p>
+          <a:p>
+            <a:r>
+              <a:rPr lang="en-US" sz="2800" dirty="0">
+                <a:solidFill>
+                  <a:schemeClr val="bg1"/>
+                </a:solidFill>
+                <a:latin typeface="Consolas" panose="020B0609020204030204" pitchFamily="49" charset="0"/>
+              </a:rPr>
+              <a:t>Usage: phototag config [OPTIONS]</a:t>
             </a:r>
           </a:p>
           <a:p>
@@ -4711,7 +4368,19 @@
                 </a:solidFill>
                 <a:latin typeface="Consolas" panose="020B0609020204030204" pitchFamily="49" charset="0"/>
               </a:rPr>
-              <a:t>Usage: phototag search [OPTIONS]</a:t>
+              <a:t>  </a:t>
+            </a:r>
+            <a:r>
+              <a:rPr lang="en-US" sz="2800" b="1" dirty="0">
+                <a:solidFill>
+                  <a:schemeClr val="accent1">
+                    <a:lumMod val="60000"/>
+                    <a:lumOff val="40000"/>
+                  </a:schemeClr>
+                </a:solidFill>
+                <a:latin typeface="Consolas" panose="020B0609020204030204" pitchFamily="49" charset="0"/>
+              </a:rPr>
+              <a:t>Manage settings</a:t>
             </a:r>
           </a:p>
           <a:p>
@@ -4730,7 +4399,40 @@
                 </a:solidFill>
                 <a:latin typeface="Consolas" panose="020B0609020204030204" pitchFamily="49" charset="0"/>
               </a:rPr>
-              <a:t>  Search tags</a:t>
+              <a:t>Options:</a:t>
+            </a:r>
+          </a:p>
+          <a:p>
+            <a:r>
+              <a:rPr lang="en-US" sz="2800" dirty="0">
+                <a:solidFill>
+                  <a:schemeClr val="bg1"/>
+                </a:solidFill>
+                <a:latin typeface="Consolas" panose="020B0609020204030204" pitchFamily="49" charset="0"/>
+              </a:rPr>
+              <a:t>  -v, --view &lt;str&gt;      view all config settings</a:t>
+            </a:r>
+          </a:p>
+          <a:p>
+            <a:r>
+              <a:rPr lang="en-US" sz="2800" dirty="0">
+                <a:solidFill>
+                  <a:schemeClr val="bg1"/>
+                </a:solidFill>
+                <a:latin typeface="Consolas" panose="020B0609020204030204" pitchFamily="49" charset="0"/>
+              </a:rPr>
+              <a:t>  -f, --folder &lt;str&gt;    set location of photos folder</a:t>
+            </a:r>
+          </a:p>
+          <a:p>
+            <a:r>
+              <a:rPr lang="en-US" sz="2800" dirty="0">
+                <a:solidFill>
+                  <a:schemeClr val="bg1"/>
+                </a:solidFill>
+                <a:latin typeface="Consolas" panose="020B0609020204030204" pitchFamily="49" charset="0"/>
+              </a:rPr>
+              <a:t>  -h, --help            Show this message and exit.</a:t>
             </a:r>
           </a:p>
           <a:p>
@@ -4749,114 +4451,122 @@
                 </a:solidFill>
                 <a:latin typeface="Consolas" panose="020B0609020204030204" pitchFamily="49" charset="0"/>
               </a:rPr>
-              <a:t>Options:</a:t>
-            </a:r>
-          </a:p>
-          <a:p>
-            <a:r>
-              <a:rPr lang="en-US" sz="2800" dirty="0">
-                <a:solidFill>
-                  <a:schemeClr val="bg1"/>
-                </a:solidFill>
-                <a:latin typeface="Consolas" panose="020B0609020204030204" pitchFamily="49" charset="0"/>
-              </a:rPr>
-              <a:t>  -t, --tags &lt;</a:t>
-            </a:r>
-            <a:r>
-              <a:rPr lang="en-US" sz="2800" dirty="0" err="1">
-                <a:solidFill>
-                  <a:schemeClr val="bg1"/>
-                </a:solidFill>
-                <a:latin typeface="Consolas" panose="020B0609020204030204" pitchFamily="49" charset="0"/>
-              </a:rPr>
-              <a:t>str</a:t>
-            </a:r>
-            <a:r>
-              <a:rPr lang="en-US" sz="2800" dirty="0">
-                <a:solidFill>
-                  <a:schemeClr val="bg1"/>
-                </a:solidFill>
-                <a:latin typeface="Consolas" panose="020B0609020204030204" pitchFamily="49" charset="0"/>
-              </a:rPr>
-              <a:t>&gt;      tags (tag1/tag2/</a:t>
-            </a:r>
-            <a:r>
-              <a:rPr lang="en-US" sz="2800" dirty="0" err="1">
-                <a:solidFill>
-                  <a:schemeClr val="bg1"/>
-                </a:solidFill>
-                <a:latin typeface="Consolas" panose="020B0609020204030204" pitchFamily="49" charset="0"/>
-              </a:rPr>
-              <a:t>etc</a:t>
-            </a:r>
-            <a:r>
-              <a:rPr lang="en-US" sz="2800" dirty="0">
-                <a:solidFill>
-                  <a:schemeClr val="bg1"/>
-                </a:solidFill>
-                <a:latin typeface="Consolas" panose="020B0609020204030204" pitchFamily="49" charset="0"/>
-              </a:rPr>
-              <a:t>)</a:t>
-            </a:r>
-          </a:p>
-          <a:p>
-            <a:r>
-              <a:rPr lang="en-US" sz="2800" dirty="0">
-                <a:solidFill>
-                  <a:schemeClr val="bg1"/>
-                </a:solidFill>
-                <a:latin typeface="Consolas" panose="020B0609020204030204" pitchFamily="49" charset="0"/>
-              </a:rPr>
-              <a:t>  /// and/or setting</a:t>
-            </a:r>
-          </a:p>
-          <a:p>
-            <a:r>
-              <a:rPr lang="en-US" sz="2800" dirty="0">
-                <a:solidFill>
-                  <a:schemeClr val="bg1"/>
-                </a:solidFill>
-                <a:latin typeface="Consolas" panose="020B0609020204030204" pitchFamily="49" charset="0"/>
-              </a:rPr>
-              <a:t>  -f, --folder &lt;</a:t>
-            </a:r>
-            <a:r>
-              <a:rPr lang="en-US" sz="2800" dirty="0" err="1">
-                <a:solidFill>
-                  <a:schemeClr val="bg1"/>
-                </a:solidFill>
-                <a:latin typeface="Consolas" panose="020B0609020204030204" pitchFamily="49" charset="0"/>
-              </a:rPr>
-              <a:t>str</a:t>
-            </a:r>
-            <a:r>
-              <a:rPr lang="en-US" sz="2800" dirty="0">
-                <a:solidFill>
-                  <a:schemeClr val="bg1"/>
-                </a:solidFill>
-                <a:latin typeface="Consolas" panose="020B0609020204030204" pitchFamily="49" charset="0"/>
-              </a:rPr>
-              <a:t>&gt;    folder</a:t>
-            </a:r>
-          </a:p>
-          <a:p>
-            <a:r>
-              <a:rPr lang="en-US" sz="2800">
-                <a:solidFill>
-                  <a:schemeClr val="bg1"/>
-                </a:solidFill>
-                <a:latin typeface="Consolas" panose="020B0609020204030204" pitchFamily="49" charset="0"/>
-              </a:rPr>
-              <a:t>  -</a:t>
-            </a:r>
-            <a:r>
-              <a:rPr lang="en-US" sz="2800" dirty="0">
-                <a:solidFill>
-                  <a:schemeClr val="bg1"/>
-                </a:solidFill>
-                <a:latin typeface="Consolas" panose="020B0609020204030204" pitchFamily="49" charset="0"/>
-              </a:rPr>
-              <a:t>h, --help            Show this message and exit.</a:t>
+              <a:t>C:\&gt;</a:t>
+            </a:r>
+          </a:p>
+        </p:txBody>
+      </p:sp>
+    </p:spTree>
+    <p:extLst>
+      <p:ext uri="{BB962C8B-B14F-4D97-AF65-F5344CB8AC3E}">
+        <p14:creationId xmlns:p14="http://schemas.microsoft.com/office/powerpoint/2010/main" val="3020929196"/>
+      </p:ext>
+    </p:extLst>
+  </p:cSld>
+  <p:clrMapOvr>
+    <a:masterClrMapping/>
+  </p:clrMapOvr>
+</p:sld>
+</file>
+
+<file path=ppt/slides/slide7.xml><?xml version="1.0" encoding="utf-8"?>
+<p:sld xmlns:a="http://schemas.openxmlformats.org/drawingml/2006/main" xmlns:r="http://schemas.openxmlformats.org/officeDocument/2006/relationships" xmlns:p="http://schemas.openxmlformats.org/presentationml/2006/main">
+  <p:cSld>
+    <p:bg>
+      <p:bgPr>
+        <a:solidFill>
+          <a:schemeClr val="tx1"/>
+        </a:solidFill>
+        <a:effectLst/>
+      </p:bgPr>
+    </p:bg>
+    <p:spTree>
+      <p:nvGrpSpPr>
+        <p:cNvPr id="1" name=""/>
+        <p:cNvGrpSpPr/>
+        <p:nvPr/>
+      </p:nvGrpSpPr>
+      <p:grpSpPr>
+        <a:xfrm>
+          <a:off x="0" y="0"/>
+          <a:ext cx="0" cy="0"/>
+          <a:chOff x="0" y="0"/>
+          <a:chExt cx="0" cy="0"/>
+        </a:xfrm>
+      </p:grpSpPr>
+      <p:sp>
+        <p:nvSpPr>
+          <p:cNvPr id="5" name="Rectangle 4"/>
+          <p:cNvSpPr/>
+          <p:nvPr/>
+        </p:nvSpPr>
+        <p:spPr>
+          <a:xfrm>
+            <a:off x="573024" y="426720"/>
+            <a:ext cx="11021568" cy="4832092"/>
+          </a:xfrm>
+          <a:prstGeom prst="rect">
+            <a:avLst/>
+          </a:prstGeom>
+          <a:solidFill>
+            <a:schemeClr val="tx1"/>
+          </a:solidFill>
+        </p:spPr>
+        <p:txBody>
+          <a:bodyPr wrap="square">
+            <a:spAutoFit/>
+          </a:bodyPr>
+          <a:lstStyle/>
+          <a:p>
+            <a:r>
+              <a:rPr lang="en-US" sz="2800" dirty="0">
+                <a:solidFill>
+                  <a:schemeClr val="bg1"/>
+                </a:solidFill>
+                <a:latin typeface="Consolas" panose="020B0609020204030204" pitchFamily="49" charset="0"/>
+              </a:rPr>
+              <a:t>C:\&gt;</a:t>
+            </a:r>
+            <a:r>
+              <a:rPr lang="en-US" sz="2800" b="1" dirty="0">
+                <a:solidFill>
+                  <a:schemeClr val="accent1">
+                    <a:lumMod val="60000"/>
+                    <a:lumOff val="40000"/>
+                  </a:schemeClr>
+                </a:solidFill>
+                <a:latin typeface="Consolas" panose="020B0609020204030204" pitchFamily="49" charset="0"/>
+              </a:rPr>
+              <a:t>phototag view</a:t>
+            </a:r>
+            <a:r>
+              <a:rPr lang="en-US" sz="2800" b="1" dirty="0">
+                <a:solidFill>
+                  <a:schemeClr val="bg1"/>
+                </a:solidFill>
+                <a:latin typeface="Consolas" panose="020B0609020204030204" pitchFamily="49" charset="0"/>
+              </a:rPr>
+              <a:t> </a:t>
+            </a:r>
+            <a:r>
+              <a:rPr lang="en-US" sz="2800" dirty="0">
+                <a:solidFill>
+                  <a:schemeClr val="bg1"/>
+                </a:solidFill>
+                <a:latin typeface="Consolas" panose="020B0609020204030204" pitchFamily="49" charset="0"/>
+              </a:rPr>
+              <a:t>–h</a:t>
+            </a:r>
+          </a:p>
+          <a:p>
+            <a:r>
+              <a:rPr lang="en-US" sz="2800" dirty="0">
+                <a:solidFill>
+                  <a:schemeClr val="bg1"/>
+                </a:solidFill>
+                <a:latin typeface="Consolas" panose="020B0609020204030204" pitchFamily="49" charset="0"/>
+              </a:rPr>
+              <a:t>Usage: phototag view [OPTIONS]</a:t>
             </a:r>
           </a:p>
           <a:p>
@@ -4875,8 +4585,22 @@
                 </a:solidFill>
                 <a:latin typeface="Consolas" panose="020B0609020204030204" pitchFamily="49" charset="0"/>
               </a:rPr>
-              <a:t>C:\&gt;</a:t>
-            </a:r>
+              <a:t>  </a:t>
+            </a:r>
+            <a:r>
+              <a:rPr lang="en-US" sz="2800" b="1" dirty="0">
+                <a:solidFill>
+                  <a:schemeClr val="accent1">
+                    <a:lumMod val="60000"/>
+                    <a:lumOff val="40000"/>
+                  </a:schemeClr>
+                </a:solidFill>
+                <a:latin typeface="Consolas" panose="020B0609020204030204" pitchFamily="49" charset="0"/>
+              </a:rPr>
+              <a:t>View tags for a folder or photo</a:t>
+            </a:r>
+          </a:p>
+          <a:p>
             <a:endParaRPr lang="en-US" sz="2800" dirty="0">
               <a:solidFill>
                 <a:schemeClr val="bg1"/>
@@ -4884,12 +4608,522 @@
               <a:latin typeface="Consolas" panose="020B0609020204030204" pitchFamily="49" charset="0"/>
             </a:endParaRPr>
           </a:p>
+          <a:p>
+            <a:r>
+              <a:rPr lang="en-US" sz="2800" dirty="0">
+                <a:solidFill>
+                  <a:schemeClr val="bg1"/>
+                </a:solidFill>
+                <a:latin typeface="Consolas" panose="020B0609020204030204" pitchFamily="49" charset="0"/>
+              </a:rPr>
+              <a:t>Options:</a:t>
+            </a:r>
+          </a:p>
+          <a:p>
+            <a:r>
+              <a:rPr lang="en-US" sz="2800" dirty="0">
+                <a:solidFill>
+                  <a:schemeClr val="bg1"/>
+                </a:solidFill>
+                <a:latin typeface="Consolas" panose="020B0609020204030204" pitchFamily="49" charset="0"/>
+              </a:rPr>
+              <a:t>  -f, --folder &lt;str&gt;    folder</a:t>
+            </a:r>
+          </a:p>
+          <a:p>
+            <a:r>
+              <a:rPr lang="en-US" sz="2800" dirty="0">
+                <a:solidFill>
+                  <a:schemeClr val="bg1"/>
+                </a:solidFill>
+                <a:latin typeface="Consolas" panose="020B0609020204030204" pitchFamily="49" charset="0"/>
+              </a:rPr>
+              <a:t>  -p, --photo &lt;str&gt;     photo (filename)</a:t>
+            </a:r>
+          </a:p>
+          <a:p>
+            <a:r>
+              <a:rPr lang="en-US" sz="2800" dirty="0">
+                <a:solidFill>
+                  <a:schemeClr val="bg1"/>
+                </a:solidFill>
+                <a:latin typeface="Consolas" panose="020B0609020204030204" pitchFamily="49" charset="0"/>
+              </a:rPr>
+              <a:t>  -h, --help            Show this message and exit.</a:t>
+            </a:r>
+          </a:p>
+          <a:p>
+            <a:endParaRPr lang="en-US" sz="2800" dirty="0">
+              <a:solidFill>
+                <a:schemeClr val="bg1"/>
+              </a:solidFill>
+              <a:latin typeface="Consolas" panose="020B0609020204030204" pitchFamily="49" charset="0"/>
+            </a:endParaRPr>
+          </a:p>
+          <a:p>
+            <a:r>
+              <a:rPr lang="en-US" sz="2800" dirty="0">
+                <a:solidFill>
+                  <a:schemeClr val="bg1"/>
+                </a:solidFill>
+                <a:latin typeface="Consolas" panose="020B0609020204030204" pitchFamily="49" charset="0"/>
+              </a:rPr>
+              <a:t>C:\&gt;</a:t>
+            </a:r>
+          </a:p>
         </p:txBody>
       </p:sp>
     </p:spTree>
     <p:extLst>
       <p:ext uri="{BB962C8B-B14F-4D97-AF65-F5344CB8AC3E}">
-        <p14:creationId xmlns:p14="http://schemas.microsoft.com/office/powerpoint/2010/main" val="2839809489"/>
+        <p14:creationId xmlns:p14="http://schemas.microsoft.com/office/powerpoint/2010/main" val="3181880333"/>
+      </p:ext>
+    </p:extLst>
+  </p:cSld>
+  <p:clrMapOvr>
+    <a:masterClrMapping/>
+  </p:clrMapOvr>
+</p:sld>
+</file>
+
+<file path=ppt/slides/slide8.xml><?xml version="1.0" encoding="utf-8"?>
+<p:sld xmlns:a="http://schemas.openxmlformats.org/drawingml/2006/main" xmlns:r="http://schemas.openxmlformats.org/officeDocument/2006/relationships" xmlns:p="http://schemas.openxmlformats.org/presentationml/2006/main">
+  <p:cSld>
+    <p:bg>
+      <p:bgPr>
+        <a:solidFill>
+          <a:schemeClr val="tx1"/>
+        </a:solidFill>
+        <a:effectLst/>
+      </p:bgPr>
+    </p:bg>
+    <p:spTree>
+      <p:nvGrpSpPr>
+        <p:cNvPr id="1" name=""/>
+        <p:cNvGrpSpPr/>
+        <p:nvPr/>
+      </p:nvGrpSpPr>
+      <p:grpSpPr>
+        <a:xfrm>
+          <a:off x="0" y="0"/>
+          <a:ext cx="0" cy="0"/>
+          <a:chOff x="0" y="0"/>
+          <a:chExt cx="0" cy="0"/>
+        </a:xfrm>
+      </p:grpSpPr>
+      <p:sp>
+        <p:nvSpPr>
+          <p:cNvPr id="5" name="Rectangle 4"/>
+          <p:cNvSpPr/>
+          <p:nvPr/>
+        </p:nvSpPr>
+        <p:spPr>
+          <a:xfrm>
+            <a:off x="573024" y="426720"/>
+            <a:ext cx="11021568" cy="5262979"/>
+          </a:xfrm>
+          <a:prstGeom prst="rect">
+            <a:avLst/>
+          </a:prstGeom>
+          <a:solidFill>
+            <a:schemeClr val="tx1"/>
+          </a:solidFill>
+        </p:spPr>
+        <p:txBody>
+          <a:bodyPr wrap="square">
+            <a:spAutoFit/>
+          </a:bodyPr>
+          <a:lstStyle/>
+          <a:p>
+            <a:r>
+              <a:rPr lang="en-US" sz="2800" dirty="0">
+                <a:solidFill>
+                  <a:schemeClr val="bg1"/>
+                </a:solidFill>
+                <a:latin typeface="Consolas" panose="020B0609020204030204" pitchFamily="49" charset="0"/>
+              </a:rPr>
+              <a:t>C:\&gt;</a:t>
+            </a:r>
+            <a:r>
+              <a:rPr lang="en-US" sz="2800" b="1" dirty="0">
+                <a:solidFill>
+                  <a:schemeClr val="accent1">
+                    <a:lumMod val="60000"/>
+                    <a:lumOff val="40000"/>
+                  </a:schemeClr>
+                </a:solidFill>
+                <a:latin typeface="Consolas" panose="020B0609020204030204" pitchFamily="49" charset="0"/>
+              </a:rPr>
+              <a:t>phototag add</a:t>
+            </a:r>
+            <a:r>
+              <a:rPr lang="en-US" sz="2800" b="1" dirty="0">
+                <a:solidFill>
+                  <a:schemeClr val="bg1"/>
+                </a:solidFill>
+                <a:latin typeface="Consolas" panose="020B0609020204030204" pitchFamily="49" charset="0"/>
+              </a:rPr>
+              <a:t> </a:t>
+            </a:r>
+            <a:r>
+              <a:rPr lang="en-US" sz="2800" dirty="0">
+                <a:solidFill>
+                  <a:schemeClr val="bg1"/>
+                </a:solidFill>
+                <a:latin typeface="Consolas" panose="020B0609020204030204" pitchFamily="49" charset="0"/>
+              </a:rPr>
+              <a:t>–h</a:t>
+            </a:r>
+          </a:p>
+          <a:p>
+            <a:r>
+              <a:rPr lang="en-US" sz="2800" dirty="0">
+                <a:solidFill>
+                  <a:schemeClr val="bg1"/>
+                </a:solidFill>
+                <a:latin typeface="Consolas" panose="020B0609020204030204" pitchFamily="49" charset="0"/>
+              </a:rPr>
+              <a:t>Usage: phototag add [OPTIONS]</a:t>
+            </a:r>
+          </a:p>
+          <a:p>
+            <a:endParaRPr lang="en-US" sz="2800" dirty="0">
+              <a:solidFill>
+                <a:schemeClr val="bg1"/>
+              </a:solidFill>
+              <a:latin typeface="Consolas" panose="020B0609020204030204" pitchFamily="49" charset="0"/>
+            </a:endParaRPr>
+          </a:p>
+          <a:p>
+            <a:r>
+              <a:rPr lang="en-US" sz="2800" dirty="0">
+                <a:solidFill>
+                  <a:schemeClr val="bg1"/>
+                </a:solidFill>
+                <a:latin typeface="Consolas" panose="020B0609020204030204" pitchFamily="49" charset="0"/>
+              </a:rPr>
+              <a:t>  </a:t>
+            </a:r>
+            <a:r>
+              <a:rPr lang="en-US" sz="2800" b="1" dirty="0">
+                <a:solidFill>
+                  <a:schemeClr val="accent1">
+                    <a:lumMod val="60000"/>
+                    <a:lumOff val="40000"/>
+                  </a:schemeClr>
+                </a:solidFill>
+                <a:latin typeface="Consolas" panose="020B0609020204030204" pitchFamily="49" charset="0"/>
+              </a:rPr>
+              <a:t>Add tags to a folder or photo</a:t>
+            </a:r>
+          </a:p>
+          <a:p>
+            <a:endParaRPr lang="en-US" sz="2800" dirty="0">
+              <a:solidFill>
+                <a:schemeClr val="bg1"/>
+              </a:solidFill>
+              <a:latin typeface="Consolas" panose="020B0609020204030204" pitchFamily="49" charset="0"/>
+            </a:endParaRPr>
+          </a:p>
+          <a:p>
+            <a:r>
+              <a:rPr lang="en-US" sz="2800" dirty="0">
+                <a:solidFill>
+                  <a:schemeClr val="bg1"/>
+                </a:solidFill>
+                <a:latin typeface="Consolas" panose="020B0609020204030204" pitchFamily="49" charset="0"/>
+              </a:rPr>
+              <a:t>Options:</a:t>
+            </a:r>
+          </a:p>
+          <a:p>
+            <a:r>
+              <a:rPr lang="en-US" sz="2800" dirty="0">
+                <a:solidFill>
+                  <a:schemeClr val="bg1"/>
+                </a:solidFill>
+                <a:latin typeface="Consolas" panose="020B0609020204030204" pitchFamily="49" charset="0"/>
+              </a:rPr>
+              <a:t>  -t, --tags &lt;str&gt;      tags (tag1/tag2/etc)</a:t>
+            </a:r>
+          </a:p>
+          <a:p>
+            <a:r>
+              <a:rPr lang="en-US" sz="2800" dirty="0">
+                <a:solidFill>
+                  <a:schemeClr val="bg1"/>
+                </a:solidFill>
+                <a:latin typeface="Consolas" panose="020B0609020204030204" pitchFamily="49" charset="0"/>
+              </a:rPr>
+              <a:t>  -f, --folder &lt;str&gt;    folder</a:t>
+            </a:r>
+          </a:p>
+          <a:p>
+            <a:r>
+              <a:rPr lang="en-US" sz="2800" dirty="0">
+                <a:solidFill>
+                  <a:schemeClr val="bg1"/>
+                </a:solidFill>
+                <a:latin typeface="Consolas" panose="020B0609020204030204" pitchFamily="49" charset="0"/>
+              </a:rPr>
+              <a:t>  -p, --photo &lt;str&gt;     photo (filename)</a:t>
+            </a:r>
+          </a:p>
+          <a:p>
+            <a:r>
+              <a:rPr lang="en-US" sz="2800" dirty="0">
+                <a:solidFill>
+                  <a:schemeClr val="bg1"/>
+                </a:solidFill>
+                <a:latin typeface="Consolas" panose="020B0609020204030204" pitchFamily="49" charset="0"/>
+              </a:rPr>
+              <a:t>  -h, --help            Show this message and exit.</a:t>
+            </a:r>
+          </a:p>
+          <a:p>
+            <a:endParaRPr lang="en-US" sz="2800" dirty="0">
+              <a:solidFill>
+                <a:schemeClr val="bg1"/>
+              </a:solidFill>
+              <a:latin typeface="Consolas" panose="020B0609020204030204" pitchFamily="49" charset="0"/>
+            </a:endParaRPr>
+          </a:p>
+          <a:p>
+            <a:r>
+              <a:rPr lang="en-US" sz="2800" dirty="0">
+                <a:solidFill>
+                  <a:schemeClr val="bg1"/>
+                </a:solidFill>
+                <a:latin typeface="Consolas" panose="020B0609020204030204" pitchFamily="49" charset="0"/>
+              </a:rPr>
+              <a:t>C:\&gt;</a:t>
+            </a:r>
+          </a:p>
+        </p:txBody>
+      </p:sp>
+    </p:spTree>
+    <p:extLst>
+      <p:ext uri="{BB962C8B-B14F-4D97-AF65-F5344CB8AC3E}">
+        <p14:creationId xmlns:p14="http://schemas.microsoft.com/office/powerpoint/2010/main" val="3712991545"/>
+      </p:ext>
+    </p:extLst>
+  </p:cSld>
+  <p:clrMapOvr>
+    <a:masterClrMapping/>
+  </p:clrMapOvr>
+</p:sld>
+</file>
+
+<file path=ppt/slides/slide9.xml><?xml version="1.0" encoding="utf-8"?>
+<p:sld xmlns:a="http://schemas.openxmlformats.org/drawingml/2006/main" xmlns:r="http://schemas.openxmlformats.org/officeDocument/2006/relationships" xmlns:p="http://schemas.openxmlformats.org/presentationml/2006/main">
+  <p:cSld>
+    <p:bg>
+      <p:bgPr>
+        <a:solidFill>
+          <a:schemeClr val="tx1"/>
+        </a:solidFill>
+        <a:effectLst/>
+      </p:bgPr>
+    </p:bg>
+    <p:spTree>
+      <p:nvGrpSpPr>
+        <p:cNvPr id="1" name=""/>
+        <p:cNvGrpSpPr/>
+        <p:nvPr/>
+      </p:nvGrpSpPr>
+      <p:grpSpPr>
+        <a:xfrm>
+          <a:off x="0" y="0"/>
+          <a:ext cx="0" cy="0"/>
+          <a:chOff x="0" y="0"/>
+          <a:chExt cx="0" cy="0"/>
+        </a:xfrm>
+      </p:grpSpPr>
+      <p:sp>
+        <p:nvSpPr>
+          <p:cNvPr id="5" name="Rectangle 4"/>
+          <p:cNvSpPr/>
+          <p:nvPr/>
+        </p:nvSpPr>
+        <p:spPr>
+          <a:xfrm>
+            <a:off x="573024" y="426720"/>
+            <a:ext cx="11021568" cy="5262979"/>
+          </a:xfrm>
+          <a:prstGeom prst="rect">
+            <a:avLst/>
+          </a:prstGeom>
+          <a:solidFill>
+            <a:schemeClr val="tx1"/>
+          </a:solidFill>
+        </p:spPr>
+        <p:txBody>
+          <a:bodyPr wrap="square">
+            <a:spAutoFit/>
+          </a:bodyPr>
+          <a:lstStyle/>
+          <a:p>
+            <a:r>
+              <a:rPr lang="en-US" sz="2800" dirty="0">
+                <a:solidFill>
+                  <a:schemeClr val="bg1"/>
+                </a:solidFill>
+                <a:latin typeface="Consolas" panose="020B0609020204030204" pitchFamily="49" charset="0"/>
+              </a:rPr>
+              <a:t>C:\&gt;</a:t>
+            </a:r>
+            <a:r>
+              <a:rPr lang="en-US" sz="2800" b="1" dirty="0">
+                <a:solidFill>
+                  <a:schemeClr val="accent1">
+                    <a:lumMod val="60000"/>
+                    <a:lumOff val="40000"/>
+                  </a:schemeClr>
+                </a:solidFill>
+                <a:latin typeface="Consolas" panose="020B0609020204030204" pitchFamily="49" charset="0"/>
+              </a:rPr>
+              <a:t>phototag remove</a:t>
+            </a:r>
+            <a:r>
+              <a:rPr lang="en-US" sz="2800" b="1" dirty="0">
+                <a:solidFill>
+                  <a:schemeClr val="bg1"/>
+                </a:solidFill>
+                <a:latin typeface="Consolas" panose="020B0609020204030204" pitchFamily="49" charset="0"/>
+              </a:rPr>
+              <a:t> </a:t>
+            </a:r>
+            <a:r>
+              <a:rPr lang="en-US" sz="2800" dirty="0">
+                <a:solidFill>
+                  <a:schemeClr val="bg1"/>
+                </a:solidFill>
+                <a:latin typeface="Consolas" panose="020B0609020204030204" pitchFamily="49" charset="0"/>
+              </a:rPr>
+              <a:t>–h</a:t>
+            </a:r>
+          </a:p>
+          <a:p>
+            <a:r>
+              <a:rPr lang="en-US" sz="2800" dirty="0">
+                <a:solidFill>
+                  <a:schemeClr val="bg1"/>
+                </a:solidFill>
+                <a:latin typeface="Consolas" panose="020B0609020204030204" pitchFamily="49" charset="0"/>
+              </a:rPr>
+              <a:t>Usage: phototag remove [OPTIONS]</a:t>
+            </a:r>
+          </a:p>
+          <a:p>
+            <a:endParaRPr lang="en-US" sz="2800" dirty="0">
+              <a:solidFill>
+                <a:schemeClr val="bg1"/>
+              </a:solidFill>
+              <a:latin typeface="Consolas" panose="020B0609020204030204" pitchFamily="49" charset="0"/>
+            </a:endParaRPr>
+          </a:p>
+          <a:p>
+            <a:r>
+              <a:rPr lang="en-US" sz="2800" b="1" dirty="0">
+                <a:solidFill>
+                  <a:schemeClr val="accent1">
+                    <a:lumMod val="60000"/>
+                    <a:lumOff val="40000"/>
+                  </a:schemeClr>
+                </a:solidFill>
+                <a:latin typeface="Consolas" panose="020B0609020204030204" pitchFamily="49" charset="0"/>
+              </a:rPr>
+              <a:t>  Remove tags from a folder or photo</a:t>
+            </a:r>
+          </a:p>
+          <a:p>
+            <a:endParaRPr lang="en-US" sz="2800" dirty="0">
+              <a:solidFill>
+                <a:schemeClr val="bg1"/>
+              </a:solidFill>
+              <a:latin typeface="Consolas" panose="020B0609020204030204" pitchFamily="49" charset="0"/>
+            </a:endParaRPr>
+          </a:p>
+          <a:p>
+            <a:r>
+              <a:rPr lang="en-US" sz="2800" dirty="0">
+                <a:solidFill>
+                  <a:schemeClr val="bg1"/>
+                </a:solidFill>
+                <a:latin typeface="Consolas" panose="020B0609020204030204" pitchFamily="49" charset="0"/>
+              </a:rPr>
+              <a:t>Options:</a:t>
+            </a:r>
+          </a:p>
+          <a:p>
+            <a:r>
+              <a:rPr lang="en-US" sz="2800" dirty="0">
+                <a:solidFill>
+                  <a:schemeClr val="bg1"/>
+                </a:solidFill>
+                <a:latin typeface="Consolas" panose="020B0609020204030204" pitchFamily="49" charset="0"/>
+              </a:rPr>
+              <a:t>  -t, --tags &lt;str&gt;      tags (tag1/tag2/etc)</a:t>
+            </a:r>
+          </a:p>
+          <a:p>
+            <a:r>
+              <a:rPr lang="en-US" sz="2800" dirty="0">
+                <a:solidFill>
+                  <a:schemeClr val="bg1"/>
+                </a:solidFill>
+                <a:latin typeface="Consolas" panose="020B0609020204030204" pitchFamily="49" charset="0"/>
+              </a:rPr>
+              <a:t>  -f, --folder &lt;str&gt;    folder</a:t>
+            </a:r>
+          </a:p>
+          <a:p>
+            <a:r>
+              <a:rPr lang="en-US" sz="2800" dirty="0">
+                <a:solidFill>
+                  <a:schemeClr val="bg1"/>
+                </a:solidFill>
+                <a:latin typeface="Consolas" panose="020B0609020204030204" pitchFamily="49" charset="0"/>
+              </a:rPr>
+              <a:t>  -p, --photo &lt;str&gt;     photo (filename)</a:t>
+            </a:r>
+          </a:p>
+          <a:p>
+            <a:r>
+              <a:rPr lang="en-US" sz="2800" dirty="0">
+                <a:solidFill>
+                  <a:schemeClr val="bg1"/>
+                </a:solidFill>
+                <a:latin typeface="Consolas" panose="020B0609020204030204" pitchFamily="49" charset="0"/>
+              </a:rPr>
+              <a:t>  -h, --help            Show this message and exit.</a:t>
+            </a:r>
+          </a:p>
+          <a:p>
+            <a:endParaRPr lang="en-US" sz="2800" dirty="0">
+              <a:solidFill>
+                <a:schemeClr val="bg1"/>
+              </a:solidFill>
+              <a:latin typeface="Consolas" panose="020B0609020204030204" pitchFamily="49" charset="0"/>
+            </a:endParaRPr>
+          </a:p>
+          <a:p>
+            <a:r>
+              <a:rPr lang="en-US" sz="2800" dirty="0">
+                <a:solidFill>
+                  <a:schemeClr val="bg1"/>
+                </a:solidFill>
+                <a:latin typeface="Consolas" panose="020B0609020204030204" pitchFamily="49" charset="0"/>
+              </a:rPr>
+              <a:t>C:\&gt;</a:t>
+            </a:r>
+          </a:p>
+        </p:txBody>
+      </p:sp>
+    </p:spTree>
+    <p:extLst>
+      <p:ext uri="{BB962C8B-B14F-4D97-AF65-F5344CB8AC3E}">
+        <p14:creationId xmlns:p14="http://schemas.microsoft.com/office/powerpoint/2010/main" val="1296650198"/>
       </p:ext>
     </p:extLst>
   </p:cSld>

</xml_diff>